<commit_message>
add analysis - Primitive Analysis #1
</commit_message>
<xml_diff>
--- a/report/200710Meeting.pptx
+++ b/report/200710Meeting.pptx
@@ -8,6 +8,15 @@
     <p:sldId id="256" r:id="rId2"/>
     <p:sldId id="257" r:id="rId3"/>
     <p:sldId id="258" r:id="rId4"/>
+    <p:sldId id="259" r:id="rId5"/>
+    <p:sldId id="260" r:id="rId6"/>
+    <p:sldId id="261" r:id="rId7"/>
+    <p:sldId id="262" r:id="rId8"/>
+    <p:sldId id="263" r:id="rId9"/>
+    <p:sldId id="264" r:id="rId10"/>
+    <p:sldId id="265" r:id="rId11"/>
+    <p:sldId id="266" r:id="rId12"/>
+    <p:sldId id="267" r:id="rId13"/>
   </p:sldIdLst>
   <p:sldSz cx="9144000" cy="6858000" type="screen4x3"/>
   <p:notesSz cx="6858000" cy="9144000"/>
@@ -3579,6 +3588,2635 @@
 </p:sld>
 </file>
 
+<file path=ppt/slides/slide10.xml><?xml version="1.0" encoding="utf-8"?>
+<p:sld xmlns:a="http://schemas.openxmlformats.org/drawingml/2006/main" xmlns:r="http://schemas.openxmlformats.org/officeDocument/2006/relationships" xmlns:p="http://schemas.openxmlformats.org/presentationml/2006/main">
+  <p:cSld>
+    <p:spTree>
+      <p:nvGrpSpPr>
+        <p:cNvPr id="1" name=""/>
+        <p:cNvGrpSpPr/>
+        <p:nvPr/>
+      </p:nvGrpSpPr>
+      <p:grpSpPr>
+        <a:xfrm>
+          <a:off x="0" y="0"/>
+          <a:ext cx="0" cy="0"/>
+          <a:chOff x="0" y="0"/>
+          <a:chExt cx="0" cy="0"/>
+        </a:xfrm>
+      </p:grpSpPr>
+      <p:sp>
+        <p:nvSpPr>
+          <p:cNvPr id="2" name="タイトル 1"/>
+          <p:cNvSpPr>
+            <a:spLocks noGrp="1"/>
+          </p:cNvSpPr>
+          <p:nvPr>
+            <p:ph type="title"/>
+          </p:nvPr>
+        </p:nvSpPr>
+        <p:spPr>
+          <a:xfrm>
+            <a:off x="528547" y="447705"/>
+            <a:ext cx="8229600" cy="838338"/>
+          </a:xfrm>
+        </p:spPr>
+        <p:txBody>
+          <a:bodyPr/>
+          <a:lstStyle/>
+          <a:p>
+            <a:pPr lvl="0" marL="0" indent="0">
+              <a:buNone/>
+            </a:pPr>
+            <a:r>
+              <a:rPr/>
+              <a:t>Propensity</a:t>
+            </a:r>
+            <a:r>
+              <a:rPr/>
+              <a:t> </a:t>
+            </a:r>
+            <a:r>
+              <a:rPr/>
+              <a:t>score</a:t>
+            </a:r>
+          </a:p>
+        </p:txBody>
+      </p:sp>
+      <mc:AlternateContent xmlns:mc="http://schemas.openxmlformats.org/markup-compatibility/2006">
+        <mc:Choice xmlns:a14="http://schemas.microsoft.com/office/drawing/2010/main" Requires="a14">
+          <p:sp>
+            <p:nvSpPr>
+              <p:cNvPr id="3" name="コンテンツ プレースホルダー 2"/>
+              <p:cNvSpPr>
+                <a:spLocks noGrp="1"/>
+              </p:cNvSpPr>
+              <p:nvPr>
+                <p:ph idx="1"/>
+              </p:nvPr>
+            </p:nvSpPr>
+            <p:spPr/>
+            <p:txBody>
+              <a:bodyPr/>
+              <a:lstStyle/>
+              <a:p>
+                <a:pPr lvl="1"/>
+                <a14:m>
+                  <m:oMath xmlns:m="http://schemas.openxmlformats.org/officeDocument/2006/math">
+                    <m:r>
+                      <m:t>P</m:t>
+                    </m:r>
+                    <m:r>
+                      <m:t>r</m:t>
+                    </m:r>
+                    <m:r>
+                      <m:t>o</m:t>
+                    </m:r>
+                    <m:r>
+                      <m:t>p</m:t>
+                    </m:r>
+                    <m:r>
+                      <m:t>e</m:t>
+                    </m:r>
+                    <m:r>
+                      <m:t>n</m:t>
+                    </m:r>
+                    <m:r>
+                      <m:t>s</m:t>
+                    </m:r>
+                    <m:r>
+                      <m:t>i</m:t>
+                    </m:r>
+                    <m:r>
+                      <m:t>t</m:t>
+                    </m:r>
+                    <m:r>
+                      <m:t>y</m:t>
+                    </m:r>
+                  </m:oMath>
+                </a14:m>
+                <a:r>
+                  <a:rPr/>
+                  <a:t>: 2013年に所得控除を受けていた確率をロジット分析（傾向スコア）</a:t>
+                </a:r>
+              </a:p>
+              <a:p>
+                <a:pPr lvl="2"/>
+                <a:r>
+                  <a:rPr/>
+                  <a:t>説明変数：労働所得、年齢（二乗項）、学歴ダミー、性別ダミー、居住ダミー</a:t>
+                </a:r>
+              </a:p>
+              <a:p>
+                <a:pPr lvl="2"/>
+                <a:r>
+                  <a:rPr/>
+                  <a:t>所得控除を受けていたかどうかを示す情報はあるが、欠損値が多すぎるために確率で代用する</a:t>
+                </a:r>
+              </a:p>
+            </p:txBody>
+          </p:sp>
+        </mc:Choice>
+      </mc:AlternateContent>
+    </p:spTree>
+  </p:cSld>
+</p:sld>
+</file>
+
+<file path=ppt/slides/slide11.xml><?xml version="1.0" encoding="utf-8"?>
+<p:sld xmlns:a="http://schemas.openxmlformats.org/drawingml/2006/main" xmlns:r="http://schemas.openxmlformats.org/officeDocument/2006/relationships" xmlns:p="http://schemas.openxmlformats.org/presentationml/2006/main">
+  <p:cSld>
+    <p:spTree>
+      <p:nvGrpSpPr>
+        <p:cNvPr id="1" name=""/>
+        <p:cNvGrpSpPr/>
+        <p:nvPr/>
+      </p:nvGrpSpPr>
+      <p:grpSpPr>
+        <a:xfrm>
+          <a:off x="0" y="0"/>
+          <a:ext cx="0" cy="0"/>
+          <a:chOff x="0" y="0"/>
+          <a:chExt cx="0" cy="0"/>
+        </a:xfrm>
+      </p:grpSpPr>
+      <p:sp>
+        <p:nvSpPr>
+          <p:cNvPr id="2" name="タイトル 1"/>
+          <p:cNvSpPr>
+            <a:spLocks noGrp="1"/>
+          </p:cNvSpPr>
+          <p:nvPr>
+            <p:ph type="title"/>
+          </p:nvPr>
+        </p:nvSpPr>
+        <p:spPr>
+          <a:xfrm>
+            <a:off x="528547" y="447705"/>
+            <a:ext cx="8229600" cy="838338"/>
+          </a:xfrm>
+        </p:spPr>
+        <p:txBody>
+          <a:bodyPr/>
+          <a:lstStyle/>
+          <a:p>
+            <a:pPr lvl="0" marL="0" indent="0">
+              <a:buNone/>
+            </a:pPr>
+            <a:r>
+              <a:rPr/>
+              <a:t>Distribution</a:t>
+            </a:r>
+            <a:r>
+              <a:rPr/>
+              <a:t> </a:t>
+            </a:r>
+            <a:r>
+              <a:rPr/>
+              <a:t>of</a:t>
+            </a:r>
+            <a:r>
+              <a:rPr/>
+              <a:t> </a:t>
+            </a:r>
+            <a:r>
+              <a:rPr/>
+              <a:t>Propensity</a:t>
+            </a:r>
+            <a:r>
+              <a:rPr/>
+              <a:t> </a:t>
+            </a:r>
+            <a:r>
+              <a:rPr/>
+              <a:t>Score</a:t>
+            </a:r>
+          </a:p>
+        </p:txBody>
+      </p:sp>
+      <p:pic>
+        <p:nvPicPr>
+          <p:cNvPr descr="C:/Users/vge00/Desktop/NaSTaB/report/200710Meeting_files/figure-pptx/propentisity_deduction-1.png" id="0" name="Picture 1"/>
+          <p:cNvPicPr>
+            <a:picLocks noGrp="1" noChangeAspect="1"/>
+          </p:cNvPicPr>
+          <p:nvPr/>
+        </p:nvPicPr>
+        <p:blipFill>
+          <a:blip r:embed="rId2"/>
+          <a:stretch>
+            <a:fillRect/>
+          </a:stretch>
+        </p:blipFill>
+        <p:spPr bwMode="auto">
+          <a:xfrm>
+            <a:off x="1244600" y="1536700"/>
+            <a:ext cx="6781800" cy="4521200"/>
+          </a:xfrm>
+          <a:prstGeom prst="rect">
+            <a:avLst/>
+          </a:prstGeom>
+          <a:noFill/>
+          <a:ln w="9525">
+            <a:noFill/>
+            <a:headEnd/>
+            <a:tailEnd/>
+          </a:ln>
+        </p:spPr>
+      </p:pic>
+    </p:spTree>
+  </p:cSld>
+</p:sld>
+</file>
+
+<file path=ppt/slides/slide12.xml><?xml version="1.0" encoding="utf-8"?>
+<p:sld xmlns:a="http://schemas.openxmlformats.org/drawingml/2006/main" xmlns:r="http://schemas.openxmlformats.org/officeDocument/2006/relationships" xmlns:p="http://schemas.openxmlformats.org/presentationml/2006/main">
+  <p:cSld>
+    <p:spTree>
+      <p:nvGrpSpPr>
+        <p:cNvPr id="1" name=""/>
+        <p:cNvGrpSpPr/>
+        <p:nvPr/>
+      </p:nvGrpSpPr>
+      <p:grpSpPr>
+        <a:xfrm>
+          <a:off x="0" y="0"/>
+          <a:ext cx="0" cy="0"/>
+          <a:chOff x="0" y="0"/>
+          <a:chExt cx="0" cy="0"/>
+        </a:xfrm>
+      </p:grpSpPr>
+      <p:sp>
+        <p:nvSpPr>
+          <p:cNvPr id="2" name="タイトル 1"/>
+          <p:cNvSpPr>
+            <a:spLocks noGrp="1"/>
+          </p:cNvSpPr>
+          <p:nvPr>
+            <p:ph type="title"/>
+          </p:nvPr>
+        </p:nvSpPr>
+        <p:spPr>
+          <a:xfrm>
+            <a:off x="528547" y="447705"/>
+            <a:ext cx="8229600" cy="838338"/>
+          </a:xfrm>
+        </p:spPr>
+        <p:txBody>
+          <a:bodyPr/>
+          <a:lstStyle/>
+          <a:p>
+            <a:pPr lvl="0" marL="0" indent="0">
+              <a:buNone/>
+            </a:pPr>
+            <a:r>
+              <a:rPr/>
+              <a:t>Regression</a:t>
+            </a:r>
+            <a:r>
+              <a:rPr/>
+              <a:t> </a:t>
+            </a:r>
+            <a:r>
+              <a:rPr/>
+              <a:t>Result</a:t>
+            </a:r>
+          </a:p>
+        </p:txBody>
+      </p:sp>
+      <p:graphicFrame xmlns:a="http://schemas.openxmlformats.org/drawingml/2006/main" xmlns:r="http://schemas.openxmlformats.org/officeDocument/2006/relationships" xmlns:p="http://schemas.openxmlformats.org/presentationml/2006/main">
+        <p:nvGraphicFramePr>
+          <p:cNvPr id="116869298" name=""/>
+          <p:cNvGraphicFramePr>
+            <a:graphicFrameLocks noGrp="true"/>
+          </p:cNvGraphicFramePr>
+          <p:nvPr/>
+        </p:nvGraphicFramePr>
+        <p:xfrm rot="0">
+          <a:off x="914400" y="1828800"/>
+          <a:ext cx="9144000" cy="5486400"/>
+        </p:xfrm>
+        <a:graphic>
+          <a:graphicData uri="http://schemas.openxmlformats.org/drawingml/2006/table">
+            <a:tbl>
+              <a:tblPr/>
+              <a:tblGrid>
+                <a:gridCol w="2743200"/>
+                <a:gridCol w="914400"/>
+              </a:tblGrid>
+              <a:tr h="290279">
+                <a:tc>
+                  <a:txBody>
+                    <a:bodyPr/>
+                    <a:lstStyle/>
+                    <a:p>
+                      <a:pPr algn="l" marL="63500" marR="63500">
+                        <a:spcBef>
+                          <a:spcPts val="200"/>
+                        </a:spcBef>
+                        <a:spcAft>
+                          <a:spcPts val="200"/>
+                        </a:spcAft>
+                        <a:buNone/>
+                      </a:pPr>
+                      <a:r>
+                        <a:rPr sz="1400">
+                          <a:solidFill>
+                            <a:srgbClr val="111111">
+                              <a:alpha val="100000"/>
+                            </a:srgbClr>
+                          </a:solidFill>
+                          <a:latin typeface="Arial"/>
+                          <a:cs typeface="Arial"/>
+                        </a:rPr>
+                        <a:t/>
+                      </a:r>
+                    </a:p>
+                  </a:txBody>
+                  <a:tcPr anchor="ctr" marB="0" marT="0" marR="0" marL="0">
+                    <a:lnL w="0" cmpd="sng" algn="ctr" cap="flat">
+                      <a:solidFill>
+                        <a:srgbClr val="FFFFFF">
+                          <a:alpha val="0"/>
+                        </a:srgbClr>
+                      </a:solidFill>
+                      <a:prstDash val="solid"/>
+                    </a:lnL>
+                    <a:lnR w="0" cmpd="sng" algn="ctr" cap="flat">
+                      <a:solidFill>
+                        <a:srgbClr val="FFFFFF">
+                          <a:alpha val="0"/>
+                        </a:srgbClr>
+                      </a:solidFill>
+                      <a:prstDash val="solid"/>
+                    </a:lnR>
+                    <a:lnT w="12700" cmpd="sng" algn="ctr" cap="flat">
+                      <a:solidFill>
+                        <a:srgbClr val="000000">
+                          <a:alpha val="100000"/>
+                        </a:srgbClr>
+                      </a:solidFill>
+                      <a:prstDash val="solid"/>
+                    </a:lnT>
+                    <a:lnB w="12700" cmpd="sng" algn="ctr" cap="flat">
+                      <a:solidFill>
+                        <a:srgbClr val="000000">
+                          <a:alpha val="100000"/>
+                        </a:srgbClr>
+                      </a:solidFill>
+                      <a:prstDash val="solid"/>
+                    </a:lnB>
+                  </a:tcPr>
+                </a:tc>
+                <a:tc>
+                  <a:txBody>
+                    <a:bodyPr/>
+                    <a:lstStyle/>
+                    <a:p>
+                      <a:pPr algn="ctr" marL="63500" marR="63500">
+                        <a:spcBef>
+                          <a:spcPts val="200"/>
+                        </a:spcBef>
+                        <a:spcAft>
+                          <a:spcPts val="200"/>
+                        </a:spcAft>
+                        <a:buNone/>
+                      </a:pPr>
+                      <a:r>
+                        <a:rPr sz="1400">
+                          <a:solidFill>
+                            <a:srgbClr val="111111">
+                              <a:alpha val="100000"/>
+                            </a:srgbClr>
+                          </a:solidFill>
+                          <a:latin typeface="Arial"/>
+                          <a:cs typeface="Arial"/>
+                        </a:rPr>
+                        <a:t>(1)</a:t>
+                      </a:r>
+                    </a:p>
+                  </a:txBody>
+                  <a:tcPr anchor="ctr" marB="0" marT="0" marR="0" marL="0">
+                    <a:lnL w="0" cmpd="sng" algn="ctr" cap="flat">
+                      <a:solidFill>
+                        <a:srgbClr val="FFFFFF">
+                          <a:alpha val="0"/>
+                        </a:srgbClr>
+                      </a:solidFill>
+                      <a:prstDash val="solid"/>
+                    </a:lnL>
+                    <a:lnR w="0" cmpd="sng" algn="ctr" cap="flat">
+                      <a:solidFill>
+                        <a:srgbClr val="FFFFFF">
+                          <a:alpha val="0"/>
+                        </a:srgbClr>
+                      </a:solidFill>
+                      <a:prstDash val="solid"/>
+                    </a:lnR>
+                    <a:lnT w="12700" cmpd="sng" algn="ctr" cap="flat">
+                      <a:solidFill>
+                        <a:srgbClr val="000000">
+                          <a:alpha val="100000"/>
+                        </a:srgbClr>
+                      </a:solidFill>
+                      <a:prstDash val="solid"/>
+                    </a:lnT>
+                    <a:lnB w="12700" cmpd="sng" algn="ctr" cap="flat">
+                      <a:solidFill>
+                        <a:srgbClr val="000000">
+                          <a:alpha val="100000"/>
+                        </a:srgbClr>
+                      </a:solidFill>
+                      <a:prstDash val="solid"/>
+                    </a:lnB>
+                  </a:tcPr>
+                </a:tc>
+              </a:tr>
+              <a:tr h="290279">
+                <a:tc>
+                  <a:txBody>
+                    <a:bodyPr/>
+                    <a:lstStyle/>
+                    <a:p>
+                      <a:pPr algn="l" marL="63500" marR="63500">
+                        <a:spcBef>
+                          <a:spcPts val="200"/>
+                        </a:spcBef>
+                        <a:spcAft>
+                          <a:spcPts val="200"/>
+                        </a:spcAft>
+                        <a:buNone/>
+                      </a:pPr>
+                      <a:r>
+                        <a:rPr sz="1400">
+                          <a:solidFill>
+                            <a:srgbClr val="111111">
+                              <a:alpha val="100000"/>
+                            </a:srgbClr>
+                          </a:solidFill>
+                          <a:latin typeface="Arial"/>
+                          <a:cs typeface="Arial"/>
+                        </a:rPr>
+                        <a:t>(Intercept)</a:t>
+                      </a:r>
+                    </a:p>
+                  </a:txBody>
+                  <a:tcPr anchor="ctr" marB="0" marT="0" marR="0" marL="0">
+                    <a:lnL w="0" cmpd="sng" algn="ctr" cap="flat">
+                      <a:solidFill>
+                        <a:srgbClr val="FFFFFF">
+                          <a:alpha val="0"/>
+                        </a:srgbClr>
+                      </a:solidFill>
+                      <a:prstDash val="solid"/>
+                    </a:lnL>
+                    <a:lnR w="0" cmpd="sng" algn="ctr" cap="flat">
+                      <a:solidFill>
+                        <a:srgbClr val="FFFFFF">
+                          <a:alpha val="0"/>
+                        </a:srgbClr>
+                      </a:solidFill>
+                      <a:prstDash val="solid"/>
+                    </a:lnR>
+                    <a:lnT w="0" cmpd="sng" algn="ctr" cap="flat">
+                      <a:solidFill>
+                        <a:srgbClr val="FFFFFF">
+                          <a:alpha val="0"/>
+                        </a:srgbClr>
+                      </a:solidFill>
+                      <a:prstDash val="solid"/>
+                    </a:lnT>
+                    <a:lnB w="0" cmpd="sng" algn="ctr" cap="flat">
+                      <a:solidFill>
+                        <a:srgbClr val="FFFFFF">
+                          <a:alpha val="0"/>
+                        </a:srgbClr>
+                      </a:solidFill>
+                      <a:prstDash val="solid"/>
+                    </a:lnB>
+                  </a:tcPr>
+                </a:tc>
+                <a:tc>
+                  <a:txBody>
+                    <a:bodyPr/>
+                    <a:lstStyle/>
+                    <a:p>
+                      <a:pPr algn="ctr" marL="63500" marR="63500">
+                        <a:spcBef>
+                          <a:spcPts val="200"/>
+                        </a:spcBef>
+                        <a:spcAft>
+                          <a:spcPts val="200"/>
+                        </a:spcAft>
+                        <a:buNone/>
+                      </a:pPr>
+                      <a:r>
+                        <a:rPr sz="1400">
+                          <a:solidFill>
+                            <a:srgbClr val="111111">
+                              <a:alpha val="100000"/>
+                            </a:srgbClr>
+                          </a:solidFill>
+                          <a:latin typeface="Arial"/>
+                          <a:cs typeface="Arial"/>
+                        </a:rPr>
+                        <a:t>0.594***</a:t>
+                      </a:r>
+                    </a:p>
+                  </a:txBody>
+                  <a:tcPr anchor="ctr" marB="0" marT="0" marR="0" marL="0">
+                    <a:lnL w="0" cmpd="sng" algn="ctr" cap="flat">
+                      <a:solidFill>
+                        <a:srgbClr val="FFFFFF">
+                          <a:alpha val="0"/>
+                        </a:srgbClr>
+                      </a:solidFill>
+                      <a:prstDash val="solid"/>
+                    </a:lnL>
+                    <a:lnR w="0" cmpd="sng" algn="ctr" cap="flat">
+                      <a:solidFill>
+                        <a:srgbClr val="FFFFFF">
+                          <a:alpha val="0"/>
+                        </a:srgbClr>
+                      </a:solidFill>
+                      <a:prstDash val="solid"/>
+                    </a:lnR>
+                    <a:lnT w="0" cmpd="sng" algn="ctr" cap="flat">
+                      <a:solidFill>
+                        <a:srgbClr val="FFFFFF">
+                          <a:alpha val="0"/>
+                        </a:srgbClr>
+                      </a:solidFill>
+                      <a:prstDash val="solid"/>
+                    </a:lnT>
+                    <a:lnB w="0" cmpd="sng" algn="ctr" cap="flat">
+                      <a:solidFill>
+                        <a:srgbClr val="FFFFFF">
+                          <a:alpha val="0"/>
+                        </a:srgbClr>
+                      </a:solidFill>
+                      <a:prstDash val="solid"/>
+                    </a:lnB>
+                  </a:tcPr>
+                </a:tc>
+              </a:tr>
+              <a:tr h="290279">
+                <a:tc>
+                  <a:txBody>
+                    <a:bodyPr/>
+                    <a:lstStyle/>
+                    <a:p>
+                      <a:pPr algn="l" marL="63500" marR="63500">
+                        <a:spcBef>
+                          <a:spcPts val="200"/>
+                        </a:spcBef>
+                        <a:spcAft>
+                          <a:spcPts val="200"/>
+                        </a:spcAft>
+                        <a:buNone/>
+                      </a:pPr>
+                      <a:r>
+                        <a:rPr sz="1400">
+                          <a:solidFill>
+                            <a:srgbClr val="111111">
+                              <a:alpha val="100000"/>
+                            </a:srgbClr>
+                          </a:solidFill>
+                          <a:latin typeface="Arial"/>
+                          <a:cs typeface="Arial"/>
+                        </a:rPr>
+                        <a:t/>
+                      </a:r>
+                    </a:p>
+                  </a:txBody>
+                  <a:tcPr anchor="ctr" marB="0" marT="0" marR="0" marL="0">
+                    <a:lnL w="0" cmpd="sng" algn="ctr" cap="flat">
+                      <a:solidFill>
+                        <a:srgbClr val="FFFFFF">
+                          <a:alpha val="0"/>
+                        </a:srgbClr>
+                      </a:solidFill>
+                      <a:prstDash val="solid"/>
+                    </a:lnL>
+                    <a:lnR w="0" cmpd="sng" algn="ctr" cap="flat">
+                      <a:solidFill>
+                        <a:srgbClr val="FFFFFF">
+                          <a:alpha val="0"/>
+                        </a:srgbClr>
+                      </a:solidFill>
+                      <a:prstDash val="solid"/>
+                    </a:lnR>
+                    <a:lnT w="0" cmpd="sng" algn="ctr" cap="flat">
+                      <a:solidFill>
+                        <a:srgbClr val="FFFFFF">
+                          <a:alpha val="0"/>
+                        </a:srgbClr>
+                      </a:solidFill>
+                      <a:prstDash val="solid"/>
+                    </a:lnT>
+                    <a:lnB w="0" cmpd="sng" algn="ctr" cap="flat">
+                      <a:solidFill>
+                        <a:srgbClr val="FFFFFF">
+                          <a:alpha val="0"/>
+                        </a:srgbClr>
+                      </a:solidFill>
+                      <a:prstDash val="solid"/>
+                    </a:lnB>
+                  </a:tcPr>
+                </a:tc>
+                <a:tc>
+                  <a:txBody>
+                    <a:bodyPr/>
+                    <a:lstStyle/>
+                    <a:p>
+                      <a:pPr algn="ctr" marL="63500" marR="63500">
+                        <a:spcBef>
+                          <a:spcPts val="200"/>
+                        </a:spcBef>
+                        <a:spcAft>
+                          <a:spcPts val="200"/>
+                        </a:spcAft>
+                        <a:buNone/>
+                      </a:pPr>
+                      <a:r>
+                        <a:rPr sz="1400">
+                          <a:solidFill>
+                            <a:srgbClr val="111111">
+                              <a:alpha val="100000"/>
+                            </a:srgbClr>
+                          </a:solidFill>
+                          <a:latin typeface="Arial"/>
+                          <a:cs typeface="Arial"/>
+                        </a:rPr>
+                        <a:t>(0.168)</a:t>
+                      </a:r>
+                    </a:p>
+                  </a:txBody>
+                  <a:tcPr anchor="ctr" marB="0" marT="0" marR="0" marL="0">
+                    <a:lnL w="0" cmpd="sng" algn="ctr" cap="flat">
+                      <a:solidFill>
+                        <a:srgbClr val="FFFFFF">
+                          <a:alpha val="0"/>
+                        </a:srgbClr>
+                      </a:solidFill>
+                      <a:prstDash val="solid"/>
+                    </a:lnL>
+                    <a:lnR w="0" cmpd="sng" algn="ctr" cap="flat">
+                      <a:solidFill>
+                        <a:srgbClr val="FFFFFF">
+                          <a:alpha val="0"/>
+                        </a:srgbClr>
+                      </a:solidFill>
+                      <a:prstDash val="solid"/>
+                    </a:lnR>
+                    <a:lnT w="0" cmpd="sng" algn="ctr" cap="flat">
+                      <a:solidFill>
+                        <a:srgbClr val="FFFFFF">
+                          <a:alpha val="0"/>
+                        </a:srgbClr>
+                      </a:solidFill>
+                      <a:prstDash val="solid"/>
+                    </a:lnT>
+                    <a:lnB w="0" cmpd="sng" algn="ctr" cap="flat">
+                      <a:solidFill>
+                        <a:srgbClr val="FFFFFF">
+                          <a:alpha val="0"/>
+                        </a:srgbClr>
+                      </a:solidFill>
+                      <a:prstDash val="solid"/>
+                    </a:lnB>
+                  </a:tcPr>
+                </a:tc>
+              </a:tr>
+              <a:tr h="262584">
+                <a:tc>
+                  <a:txBody>
+                    <a:bodyPr/>
+                    <a:lstStyle/>
+                    <a:p>
+                      <a:pPr algn="l" marL="63500" marR="63500">
+                        <a:spcBef>
+                          <a:spcPts val="200"/>
+                        </a:spcBef>
+                        <a:spcAft>
+                          <a:spcPts val="200"/>
+                        </a:spcAft>
+                        <a:buNone/>
+                      </a:pPr>
+                      <a:r>
+                        <a:rPr sz="1400">
+                          <a:solidFill>
+                            <a:srgbClr val="111111">
+                              <a:alpha val="100000"/>
+                            </a:srgbClr>
+                          </a:solidFill>
+                          <a:latin typeface="Arial"/>
+                          <a:cs typeface="Arial"/>
+                        </a:rPr>
+                        <a:t>Gain: MTR &lt; Credit Rate</a:t>
+                      </a:r>
+                    </a:p>
+                  </a:txBody>
+                  <a:tcPr anchor="ctr" marB="0" marT="0" marR="0" marL="0">
+                    <a:lnL w="0" cmpd="sng" algn="ctr" cap="flat">
+                      <a:solidFill>
+                        <a:srgbClr val="FFFFFF">
+                          <a:alpha val="0"/>
+                        </a:srgbClr>
+                      </a:solidFill>
+                      <a:prstDash val="solid"/>
+                    </a:lnL>
+                    <a:lnR w="0" cmpd="sng" algn="ctr" cap="flat">
+                      <a:solidFill>
+                        <a:srgbClr val="FFFFFF">
+                          <a:alpha val="0"/>
+                        </a:srgbClr>
+                      </a:solidFill>
+                      <a:prstDash val="solid"/>
+                    </a:lnR>
+                    <a:lnT w="0" cmpd="sng" algn="ctr" cap="flat">
+                      <a:solidFill>
+                        <a:srgbClr val="FFFFFF">
+                          <a:alpha val="0"/>
+                        </a:srgbClr>
+                      </a:solidFill>
+                      <a:prstDash val="solid"/>
+                    </a:lnT>
+                    <a:lnB w="0" cmpd="sng" algn="ctr" cap="flat">
+                      <a:solidFill>
+                        <a:srgbClr val="FFFFFF">
+                          <a:alpha val="0"/>
+                        </a:srgbClr>
+                      </a:solidFill>
+                      <a:prstDash val="solid"/>
+                    </a:lnB>
+                  </a:tcPr>
+                </a:tc>
+                <a:tc>
+                  <a:txBody>
+                    <a:bodyPr/>
+                    <a:lstStyle/>
+                    <a:p>
+                      <a:pPr algn="ctr" marL="63500" marR="63500">
+                        <a:spcBef>
+                          <a:spcPts val="200"/>
+                        </a:spcBef>
+                        <a:spcAft>
+                          <a:spcPts val="200"/>
+                        </a:spcAft>
+                        <a:buNone/>
+                      </a:pPr>
+                      <a:r>
+                        <a:rPr sz="1400">
+                          <a:solidFill>
+                            <a:srgbClr val="111111">
+                              <a:alpha val="100000"/>
+                            </a:srgbClr>
+                          </a:solidFill>
+                          <a:latin typeface="Arial"/>
+                          <a:cs typeface="Arial"/>
+                        </a:rPr>
+                        <a:t>0.184**</a:t>
+                      </a:r>
+                    </a:p>
+                  </a:txBody>
+                  <a:tcPr anchor="ctr" marB="0" marT="0" marR="0" marL="0">
+                    <a:lnL w="0" cmpd="sng" algn="ctr" cap="flat">
+                      <a:solidFill>
+                        <a:srgbClr val="FFFFFF">
+                          <a:alpha val="0"/>
+                        </a:srgbClr>
+                      </a:solidFill>
+                      <a:prstDash val="solid"/>
+                    </a:lnL>
+                    <a:lnR w="0" cmpd="sng" algn="ctr" cap="flat">
+                      <a:solidFill>
+                        <a:srgbClr val="FFFFFF">
+                          <a:alpha val="0"/>
+                        </a:srgbClr>
+                      </a:solidFill>
+                      <a:prstDash val="solid"/>
+                    </a:lnR>
+                    <a:lnT w="0" cmpd="sng" algn="ctr" cap="flat">
+                      <a:solidFill>
+                        <a:srgbClr val="FFFFFF">
+                          <a:alpha val="0"/>
+                        </a:srgbClr>
+                      </a:solidFill>
+                      <a:prstDash val="solid"/>
+                    </a:lnT>
+                    <a:lnB w="0" cmpd="sng" algn="ctr" cap="flat">
+                      <a:solidFill>
+                        <a:srgbClr val="FFFFFF">
+                          <a:alpha val="0"/>
+                        </a:srgbClr>
+                      </a:solidFill>
+                      <a:prstDash val="solid"/>
+                    </a:lnB>
+                  </a:tcPr>
+                </a:tc>
+              </a:tr>
+              <a:tr h="290279">
+                <a:tc>
+                  <a:txBody>
+                    <a:bodyPr/>
+                    <a:lstStyle/>
+                    <a:p>
+                      <a:pPr algn="l" marL="63500" marR="63500">
+                        <a:spcBef>
+                          <a:spcPts val="200"/>
+                        </a:spcBef>
+                        <a:spcAft>
+                          <a:spcPts val="200"/>
+                        </a:spcAft>
+                        <a:buNone/>
+                      </a:pPr>
+                      <a:r>
+                        <a:rPr sz="1400">
+                          <a:solidFill>
+                            <a:srgbClr val="111111">
+                              <a:alpha val="100000"/>
+                            </a:srgbClr>
+                          </a:solidFill>
+                          <a:latin typeface="Arial"/>
+                          <a:cs typeface="Arial"/>
+                        </a:rPr>
+                        <a:t/>
+                      </a:r>
+                    </a:p>
+                  </a:txBody>
+                  <a:tcPr anchor="ctr" marB="0" marT="0" marR="0" marL="0">
+                    <a:lnL w="0" cmpd="sng" algn="ctr" cap="flat">
+                      <a:solidFill>
+                        <a:srgbClr val="FFFFFF">
+                          <a:alpha val="0"/>
+                        </a:srgbClr>
+                      </a:solidFill>
+                      <a:prstDash val="solid"/>
+                    </a:lnL>
+                    <a:lnR w="0" cmpd="sng" algn="ctr" cap="flat">
+                      <a:solidFill>
+                        <a:srgbClr val="FFFFFF">
+                          <a:alpha val="0"/>
+                        </a:srgbClr>
+                      </a:solidFill>
+                      <a:prstDash val="solid"/>
+                    </a:lnR>
+                    <a:lnT w="0" cmpd="sng" algn="ctr" cap="flat">
+                      <a:solidFill>
+                        <a:srgbClr val="FFFFFF">
+                          <a:alpha val="0"/>
+                        </a:srgbClr>
+                      </a:solidFill>
+                      <a:prstDash val="solid"/>
+                    </a:lnT>
+                    <a:lnB w="0" cmpd="sng" algn="ctr" cap="flat">
+                      <a:solidFill>
+                        <a:srgbClr val="FFFFFF">
+                          <a:alpha val="0"/>
+                        </a:srgbClr>
+                      </a:solidFill>
+                      <a:prstDash val="solid"/>
+                    </a:lnB>
+                  </a:tcPr>
+                </a:tc>
+                <a:tc>
+                  <a:txBody>
+                    <a:bodyPr/>
+                    <a:lstStyle/>
+                    <a:p>
+                      <a:pPr algn="ctr" marL="63500" marR="63500">
+                        <a:spcBef>
+                          <a:spcPts val="200"/>
+                        </a:spcBef>
+                        <a:spcAft>
+                          <a:spcPts val="200"/>
+                        </a:spcAft>
+                        <a:buNone/>
+                      </a:pPr>
+                      <a:r>
+                        <a:rPr sz="1400">
+                          <a:solidFill>
+                            <a:srgbClr val="111111">
+                              <a:alpha val="100000"/>
+                            </a:srgbClr>
+                          </a:solidFill>
+                          <a:latin typeface="Arial"/>
+                          <a:cs typeface="Arial"/>
+                        </a:rPr>
+                        <a:t>(0.090)</a:t>
+                      </a:r>
+                    </a:p>
+                  </a:txBody>
+                  <a:tcPr anchor="ctr" marB="0" marT="0" marR="0" marL="0">
+                    <a:lnL w="0" cmpd="sng" algn="ctr" cap="flat">
+                      <a:solidFill>
+                        <a:srgbClr val="FFFFFF">
+                          <a:alpha val="0"/>
+                        </a:srgbClr>
+                      </a:solidFill>
+                      <a:prstDash val="solid"/>
+                    </a:lnL>
+                    <a:lnR w="0" cmpd="sng" algn="ctr" cap="flat">
+                      <a:solidFill>
+                        <a:srgbClr val="FFFFFF">
+                          <a:alpha val="0"/>
+                        </a:srgbClr>
+                      </a:solidFill>
+                      <a:prstDash val="solid"/>
+                    </a:lnR>
+                    <a:lnT w="0" cmpd="sng" algn="ctr" cap="flat">
+                      <a:solidFill>
+                        <a:srgbClr val="FFFFFF">
+                          <a:alpha val="0"/>
+                        </a:srgbClr>
+                      </a:solidFill>
+                      <a:prstDash val="solid"/>
+                    </a:lnT>
+                    <a:lnB w="0" cmpd="sng" algn="ctr" cap="flat">
+                      <a:solidFill>
+                        <a:srgbClr val="FFFFFF">
+                          <a:alpha val="0"/>
+                        </a:srgbClr>
+                      </a:solidFill>
+                      <a:prstDash val="solid"/>
+                    </a:lnB>
+                  </a:tcPr>
+                </a:tc>
+              </a:tr>
+              <a:tr h="262584">
+                <a:tc>
+                  <a:txBody>
+                    <a:bodyPr/>
+                    <a:lstStyle/>
+                    <a:p>
+                      <a:pPr algn="l" marL="63500" marR="63500">
+                        <a:spcBef>
+                          <a:spcPts val="200"/>
+                        </a:spcBef>
+                        <a:spcAft>
+                          <a:spcPts val="200"/>
+                        </a:spcAft>
+                        <a:buNone/>
+                      </a:pPr>
+                      <a:r>
+                        <a:rPr sz="1400">
+                          <a:solidFill>
+                            <a:srgbClr val="111111">
+                              <a:alpha val="100000"/>
+                            </a:srgbClr>
+                          </a:solidFill>
+                          <a:latin typeface="Arial"/>
+                          <a:cs typeface="Arial"/>
+                        </a:rPr>
+                        <a:t>Loss: MTR &gt; Credit Rate</a:t>
+                      </a:r>
+                    </a:p>
+                  </a:txBody>
+                  <a:tcPr anchor="ctr" marB="0" marT="0" marR="0" marL="0">
+                    <a:lnL w="0" cmpd="sng" algn="ctr" cap="flat">
+                      <a:solidFill>
+                        <a:srgbClr val="FFFFFF">
+                          <a:alpha val="0"/>
+                        </a:srgbClr>
+                      </a:solidFill>
+                      <a:prstDash val="solid"/>
+                    </a:lnL>
+                    <a:lnR w="0" cmpd="sng" algn="ctr" cap="flat">
+                      <a:solidFill>
+                        <a:srgbClr val="FFFFFF">
+                          <a:alpha val="0"/>
+                        </a:srgbClr>
+                      </a:solidFill>
+                      <a:prstDash val="solid"/>
+                    </a:lnR>
+                    <a:lnT w="0" cmpd="sng" algn="ctr" cap="flat">
+                      <a:solidFill>
+                        <a:srgbClr val="FFFFFF">
+                          <a:alpha val="0"/>
+                        </a:srgbClr>
+                      </a:solidFill>
+                      <a:prstDash val="solid"/>
+                    </a:lnT>
+                    <a:lnB w="0" cmpd="sng" algn="ctr" cap="flat">
+                      <a:solidFill>
+                        <a:srgbClr val="FFFFFF">
+                          <a:alpha val="0"/>
+                        </a:srgbClr>
+                      </a:solidFill>
+                      <a:prstDash val="solid"/>
+                    </a:lnB>
+                  </a:tcPr>
+                </a:tc>
+                <a:tc>
+                  <a:txBody>
+                    <a:bodyPr/>
+                    <a:lstStyle/>
+                    <a:p>
+                      <a:pPr algn="ctr" marL="63500" marR="63500">
+                        <a:spcBef>
+                          <a:spcPts val="200"/>
+                        </a:spcBef>
+                        <a:spcAft>
+                          <a:spcPts val="200"/>
+                        </a:spcAft>
+                        <a:buNone/>
+                      </a:pPr>
+                      <a:r>
+                        <a:rPr sz="1400">
+                          <a:solidFill>
+                            <a:srgbClr val="111111">
+                              <a:alpha val="100000"/>
+                            </a:srgbClr>
+                          </a:solidFill>
+                          <a:latin typeface="Arial"/>
+                          <a:cs typeface="Arial"/>
+                        </a:rPr>
+                        <a:t>0.063</a:t>
+                      </a:r>
+                    </a:p>
+                  </a:txBody>
+                  <a:tcPr anchor="ctr" marB="0" marT="0" marR="0" marL="0">
+                    <a:lnL w="0" cmpd="sng" algn="ctr" cap="flat">
+                      <a:solidFill>
+                        <a:srgbClr val="FFFFFF">
+                          <a:alpha val="0"/>
+                        </a:srgbClr>
+                      </a:solidFill>
+                      <a:prstDash val="solid"/>
+                    </a:lnL>
+                    <a:lnR w="0" cmpd="sng" algn="ctr" cap="flat">
+                      <a:solidFill>
+                        <a:srgbClr val="FFFFFF">
+                          <a:alpha val="0"/>
+                        </a:srgbClr>
+                      </a:solidFill>
+                      <a:prstDash val="solid"/>
+                    </a:lnR>
+                    <a:lnT w="0" cmpd="sng" algn="ctr" cap="flat">
+                      <a:solidFill>
+                        <a:srgbClr val="FFFFFF">
+                          <a:alpha val="0"/>
+                        </a:srgbClr>
+                      </a:solidFill>
+                      <a:prstDash val="solid"/>
+                    </a:lnT>
+                    <a:lnB w="0" cmpd="sng" algn="ctr" cap="flat">
+                      <a:solidFill>
+                        <a:srgbClr val="FFFFFF">
+                          <a:alpha val="0"/>
+                        </a:srgbClr>
+                      </a:solidFill>
+                      <a:prstDash val="solid"/>
+                    </a:lnB>
+                  </a:tcPr>
+                </a:tc>
+              </a:tr>
+              <a:tr h="290279">
+                <a:tc>
+                  <a:txBody>
+                    <a:bodyPr/>
+                    <a:lstStyle/>
+                    <a:p>
+                      <a:pPr algn="l" marL="63500" marR="63500">
+                        <a:spcBef>
+                          <a:spcPts val="200"/>
+                        </a:spcBef>
+                        <a:spcAft>
+                          <a:spcPts val="200"/>
+                        </a:spcAft>
+                        <a:buNone/>
+                      </a:pPr>
+                      <a:r>
+                        <a:rPr sz="1400">
+                          <a:solidFill>
+                            <a:srgbClr val="111111">
+                              <a:alpha val="100000"/>
+                            </a:srgbClr>
+                          </a:solidFill>
+                          <a:latin typeface="Arial"/>
+                          <a:cs typeface="Arial"/>
+                        </a:rPr>
+                        <a:t/>
+                      </a:r>
+                    </a:p>
+                  </a:txBody>
+                  <a:tcPr anchor="ctr" marB="0" marT="0" marR="0" marL="0">
+                    <a:lnL w="0" cmpd="sng" algn="ctr" cap="flat">
+                      <a:solidFill>
+                        <a:srgbClr val="FFFFFF">
+                          <a:alpha val="0"/>
+                        </a:srgbClr>
+                      </a:solidFill>
+                      <a:prstDash val="solid"/>
+                    </a:lnL>
+                    <a:lnR w="0" cmpd="sng" algn="ctr" cap="flat">
+                      <a:solidFill>
+                        <a:srgbClr val="FFFFFF">
+                          <a:alpha val="0"/>
+                        </a:srgbClr>
+                      </a:solidFill>
+                      <a:prstDash val="solid"/>
+                    </a:lnR>
+                    <a:lnT w="0" cmpd="sng" algn="ctr" cap="flat">
+                      <a:solidFill>
+                        <a:srgbClr val="FFFFFF">
+                          <a:alpha val="0"/>
+                        </a:srgbClr>
+                      </a:solidFill>
+                      <a:prstDash val="solid"/>
+                    </a:lnT>
+                    <a:lnB w="0" cmpd="sng" algn="ctr" cap="flat">
+                      <a:solidFill>
+                        <a:srgbClr val="FFFFFF">
+                          <a:alpha val="0"/>
+                        </a:srgbClr>
+                      </a:solidFill>
+                      <a:prstDash val="solid"/>
+                    </a:lnB>
+                  </a:tcPr>
+                </a:tc>
+                <a:tc>
+                  <a:txBody>
+                    <a:bodyPr/>
+                    <a:lstStyle/>
+                    <a:p>
+                      <a:pPr algn="ctr" marL="63500" marR="63500">
+                        <a:spcBef>
+                          <a:spcPts val="200"/>
+                        </a:spcBef>
+                        <a:spcAft>
+                          <a:spcPts val="200"/>
+                        </a:spcAft>
+                        <a:buNone/>
+                      </a:pPr>
+                      <a:r>
+                        <a:rPr sz="1400">
+                          <a:solidFill>
+                            <a:srgbClr val="111111">
+                              <a:alpha val="100000"/>
+                            </a:srgbClr>
+                          </a:solidFill>
+                          <a:latin typeface="Arial"/>
+                          <a:cs typeface="Arial"/>
+                        </a:rPr>
+                        <a:t>(0.102)</a:t>
+                      </a:r>
+                    </a:p>
+                  </a:txBody>
+                  <a:tcPr anchor="ctr" marB="0" marT="0" marR="0" marL="0">
+                    <a:lnL w="0" cmpd="sng" algn="ctr" cap="flat">
+                      <a:solidFill>
+                        <a:srgbClr val="FFFFFF">
+                          <a:alpha val="0"/>
+                        </a:srgbClr>
+                      </a:solidFill>
+                      <a:prstDash val="solid"/>
+                    </a:lnL>
+                    <a:lnR w="0" cmpd="sng" algn="ctr" cap="flat">
+                      <a:solidFill>
+                        <a:srgbClr val="FFFFFF">
+                          <a:alpha val="0"/>
+                        </a:srgbClr>
+                      </a:solidFill>
+                      <a:prstDash val="solid"/>
+                    </a:lnR>
+                    <a:lnT w="0" cmpd="sng" algn="ctr" cap="flat">
+                      <a:solidFill>
+                        <a:srgbClr val="FFFFFF">
+                          <a:alpha val="0"/>
+                        </a:srgbClr>
+                      </a:solidFill>
+                      <a:prstDash val="solid"/>
+                    </a:lnT>
+                    <a:lnB w="0" cmpd="sng" algn="ctr" cap="flat">
+                      <a:solidFill>
+                        <a:srgbClr val="FFFFFF">
+                          <a:alpha val="0"/>
+                        </a:srgbClr>
+                      </a:solidFill>
+                      <a:prstDash val="solid"/>
+                    </a:lnB>
+                  </a:tcPr>
+                </a:tc>
+              </a:tr>
+              <a:tr h="262584">
+                <a:tc>
+                  <a:txBody>
+                    <a:bodyPr/>
+                    <a:lstStyle/>
+                    <a:p>
+                      <a:pPr algn="l" marL="63500" marR="63500">
+                        <a:spcBef>
+                          <a:spcPts val="200"/>
+                        </a:spcBef>
+                        <a:spcAft>
+                          <a:spcPts val="200"/>
+                        </a:spcAft>
+                        <a:buNone/>
+                      </a:pPr>
+                      <a:r>
+                        <a:rPr sz="1400">
+                          <a:solidFill>
+                            <a:srgbClr val="111111">
+                              <a:alpha val="100000"/>
+                            </a:srgbClr>
+                          </a:solidFill>
+                          <a:latin typeface="Arial"/>
+                          <a:cs typeface="Arial"/>
+                        </a:rPr>
+                        <a:t>P-Score</a:t>
+                      </a:r>
+                    </a:p>
+                  </a:txBody>
+                  <a:tcPr anchor="ctr" marB="0" marT="0" marR="0" marL="0">
+                    <a:lnL w="0" cmpd="sng" algn="ctr" cap="flat">
+                      <a:solidFill>
+                        <a:srgbClr val="FFFFFF">
+                          <a:alpha val="0"/>
+                        </a:srgbClr>
+                      </a:solidFill>
+                      <a:prstDash val="solid"/>
+                    </a:lnL>
+                    <a:lnR w="0" cmpd="sng" algn="ctr" cap="flat">
+                      <a:solidFill>
+                        <a:srgbClr val="FFFFFF">
+                          <a:alpha val="0"/>
+                        </a:srgbClr>
+                      </a:solidFill>
+                      <a:prstDash val="solid"/>
+                    </a:lnR>
+                    <a:lnT w="0" cmpd="sng" algn="ctr" cap="flat">
+                      <a:solidFill>
+                        <a:srgbClr val="FFFFFF">
+                          <a:alpha val="0"/>
+                        </a:srgbClr>
+                      </a:solidFill>
+                      <a:prstDash val="solid"/>
+                    </a:lnT>
+                    <a:lnB w="0" cmpd="sng" algn="ctr" cap="flat">
+                      <a:solidFill>
+                        <a:srgbClr val="FFFFFF">
+                          <a:alpha val="0"/>
+                        </a:srgbClr>
+                      </a:solidFill>
+                      <a:prstDash val="solid"/>
+                    </a:lnB>
+                  </a:tcPr>
+                </a:tc>
+                <a:tc>
+                  <a:txBody>
+                    <a:bodyPr/>
+                    <a:lstStyle/>
+                    <a:p>
+                      <a:pPr algn="ctr" marL="63500" marR="63500">
+                        <a:spcBef>
+                          <a:spcPts val="200"/>
+                        </a:spcBef>
+                        <a:spcAft>
+                          <a:spcPts val="200"/>
+                        </a:spcAft>
+                        <a:buNone/>
+                      </a:pPr>
+                      <a:r>
+                        <a:rPr sz="1400">
+                          <a:solidFill>
+                            <a:srgbClr val="111111">
+                              <a:alpha val="100000"/>
+                            </a:srgbClr>
+                          </a:solidFill>
+                          <a:latin typeface="Arial"/>
+                          <a:cs typeface="Arial"/>
+                        </a:rPr>
+                        <a:t>-0.035</a:t>
+                      </a:r>
+                    </a:p>
+                  </a:txBody>
+                  <a:tcPr anchor="ctr" marB="0" marT="0" marR="0" marL="0">
+                    <a:lnL w="0" cmpd="sng" algn="ctr" cap="flat">
+                      <a:solidFill>
+                        <a:srgbClr val="FFFFFF">
+                          <a:alpha val="0"/>
+                        </a:srgbClr>
+                      </a:solidFill>
+                      <a:prstDash val="solid"/>
+                    </a:lnL>
+                    <a:lnR w="0" cmpd="sng" algn="ctr" cap="flat">
+                      <a:solidFill>
+                        <a:srgbClr val="FFFFFF">
+                          <a:alpha val="0"/>
+                        </a:srgbClr>
+                      </a:solidFill>
+                      <a:prstDash val="solid"/>
+                    </a:lnR>
+                    <a:lnT w="0" cmpd="sng" algn="ctr" cap="flat">
+                      <a:solidFill>
+                        <a:srgbClr val="FFFFFF">
+                          <a:alpha val="0"/>
+                        </a:srgbClr>
+                      </a:solidFill>
+                      <a:prstDash val="solid"/>
+                    </a:lnT>
+                    <a:lnB w="0" cmpd="sng" algn="ctr" cap="flat">
+                      <a:solidFill>
+                        <a:srgbClr val="FFFFFF">
+                          <a:alpha val="0"/>
+                        </a:srgbClr>
+                      </a:solidFill>
+                      <a:prstDash val="solid"/>
+                    </a:lnB>
+                  </a:tcPr>
+                </a:tc>
+              </a:tr>
+              <a:tr h="290279">
+                <a:tc>
+                  <a:txBody>
+                    <a:bodyPr/>
+                    <a:lstStyle/>
+                    <a:p>
+                      <a:pPr algn="l" marL="63500" marR="63500">
+                        <a:spcBef>
+                          <a:spcPts val="200"/>
+                        </a:spcBef>
+                        <a:spcAft>
+                          <a:spcPts val="200"/>
+                        </a:spcAft>
+                        <a:buNone/>
+                      </a:pPr>
+                      <a:r>
+                        <a:rPr sz="1400">
+                          <a:solidFill>
+                            <a:srgbClr val="111111">
+                              <a:alpha val="100000"/>
+                            </a:srgbClr>
+                          </a:solidFill>
+                          <a:latin typeface="Arial"/>
+                          <a:cs typeface="Arial"/>
+                        </a:rPr>
+                        <a:t/>
+                      </a:r>
+                    </a:p>
+                  </a:txBody>
+                  <a:tcPr anchor="ctr" marB="0" marT="0" marR="0" marL="0">
+                    <a:lnL w="0" cmpd="sng" algn="ctr" cap="flat">
+                      <a:solidFill>
+                        <a:srgbClr val="FFFFFF">
+                          <a:alpha val="0"/>
+                        </a:srgbClr>
+                      </a:solidFill>
+                      <a:prstDash val="solid"/>
+                    </a:lnL>
+                    <a:lnR w="0" cmpd="sng" algn="ctr" cap="flat">
+                      <a:solidFill>
+                        <a:srgbClr val="FFFFFF">
+                          <a:alpha val="0"/>
+                        </a:srgbClr>
+                      </a:solidFill>
+                      <a:prstDash val="solid"/>
+                    </a:lnR>
+                    <a:lnT w="0" cmpd="sng" algn="ctr" cap="flat">
+                      <a:solidFill>
+                        <a:srgbClr val="FFFFFF">
+                          <a:alpha val="0"/>
+                        </a:srgbClr>
+                      </a:solidFill>
+                      <a:prstDash val="solid"/>
+                    </a:lnT>
+                    <a:lnB w="0" cmpd="sng" algn="ctr" cap="flat">
+                      <a:solidFill>
+                        <a:srgbClr val="FFFFFF">
+                          <a:alpha val="0"/>
+                        </a:srgbClr>
+                      </a:solidFill>
+                      <a:prstDash val="solid"/>
+                    </a:lnB>
+                  </a:tcPr>
+                </a:tc>
+                <a:tc>
+                  <a:txBody>
+                    <a:bodyPr/>
+                    <a:lstStyle/>
+                    <a:p>
+                      <a:pPr algn="ctr" marL="63500" marR="63500">
+                        <a:spcBef>
+                          <a:spcPts val="200"/>
+                        </a:spcBef>
+                        <a:spcAft>
+                          <a:spcPts val="200"/>
+                        </a:spcAft>
+                        <a:buNone/>
+                      </a:pPr>
+                      <a:r>
+                        <a:rPr sz="1400">
+                          <a:solidFill>
+                            <a:srgbClr val="111111">
+                              <a:alpha val="100000"/>
+                            </a:srgbClr>
+                          </a:solidFill>
+                          <a:latin typeface="Arial"/>
+                          <a:cs typeface="Arial"/>
+                        </a:rPr>
+                        <a:t>(0.184)</a:t>
+                      </a:r>
+                    </a:p>
+                  </a:txBody>
+                  <a:tcPr anchor="ctr" marB="0" marT="0" marR="0" marL="0">
+                    <a:lnL w="0" cmpd="sng" algn="ctr" cap="flat">
+                      <a:solidFill>
+                        <a:srgbClr val="FFFFFF">
+                          <a:alpha val="0"/>
+                        </a:srgbClr>
+                      </a:solidFill>
+                      <a:prstDash val="solid"/>
+                    </a:lnL>
+                    <a:lnR w="0" cmpd="sng" algn="ctr" cap="flat">
+                      <a:solidFill>
+                        <a:srgbClr val="FFFFFF">
+                          <a:alpha val="0"/>
+                        </a:srgbClr>
+                      </a:solidFill>
+                      <a:prstDash val="solid"/>
+                    </a:lnR>
+                    <a:lnT w="0" cmpd="sng" algn="ctr" cap="flat">
+                      <a:solidFill>
+                        <a:srgbClr val="FFFFFF">
+                          <a:alpha val="0"/>
+                        </a:srgbClr>
+                      </a:solidFill>
+                      <a:prstDash val="solid"/>
+                    </a:lnT>
+                    <a:lnB w="0" cmpd="sng" algn="ctr" cap="flat">
+                      <a:solidFill>
+                        <a:srgbClr val="FFFFFF">
+                          <a:alpha val="0"/>
+                        </a:srgbClr>
+                      </a:solidFill>
+                      <a:prstDash val="solid"/>
+                    </a:lnB>
+                  </a:tcPr>
+                </a:tc>
+              </a:tr>
+              <a:tr h="262584">
+                <a:tc>
+                  <a:txBody>
+                    <a:bodyPr/>
+                    <a:lstStyle/>
+                    <a:p>
+                      <a:pPr algn="l" marL="63500" marR="63500">
+                        <a:spcBef>
+                          <a:spcPts val="200"/>
+                        </a:spcBef>
+                        <a:spcAft>
+                          <a:spcPts val="200"/>
+                        </a:spcAft>
+                        <a:buNone/>
+                      </a:pPr>
+                      <a:r>
+                        <a:rPr sz="1400">
+                          <a:solidFill>
+                            <a:srgbClr val="111111">
+                              <a:alpha val="100000"/>
+                            </a:srgbClr>
+                          </a:solidFill>
+                          <a:latin typeface="Arial"/>
+                          <a:cs typeface="Arial"/>
+                        </a:rPr>
+                        <a:t>Gain X P-Score</a:t>
+                      </a:r>
+                    </a:p>
+                  </a:txBody>
+                  <a:tcPr anchor="ctr" marB="0" marT="0" marR="0" marL="0">
+                    <a:lnL w="0" cmpd="sng" algn="ctr" cap="flat">
+                      <a:solidFill>
+                        <a:srgbClr val="FFFFFF">
+                          <a:alpha val="0"/>
+                        </a:srgbClr>
+                      </a:solidFill>
+                      <a:prstDash val="solid"/>
+                    </a:lnL>
+                    <a:lnR w="0" cmpd="sng" algn="ctr" cap="flat">
+                      <a:solidFill>
+                        <a:srgbClr val="FFFFFF">
+                          <a:alpha val="0"/>
+                        </a:srgbClr>
+                      </a:solidFill>
+                      <a:prstDash val="solid"/>
+                    </a:lnR>
+                    <a:lnT w="0" cmpd="sng" algn="ctr" cap="flat">
+                      <a:solidFill>
+                        <a:srgbClr val="FFFFFF">
+                          <a:alpha val="0"/>
+                        </a:srgbClr>
+                      </a:solidFill>
+                      <a:prstDash val="solid"/>
+                    </a:lnT>
+                    <a:lnB w="0" cmpd="sng" algn="ctr" cap="flat">
+                      <a:solidFill>
+                        <a:srgbClr val="FFFFFF">
+                          <a:alpha val="0"/>
+                        </a:srgbClr>
+                      </a:solidFill>
+                      <a:prstDash val="solid"/>
+                    </a:lnB>
+                  </a:tcPr>
+                </a:tc>
+                <a:tc>
+                  <a:txBody>
+                    <a:bodyPr/>
+                    <a:lstStyle/>
+                    <a:p>
+                      <a:pPr algn="ctr" marL="63500" marR="63500">
+                        <a:spcBef>
+                          <a:spcPts val="200"/>
+                        </a:spcBef>
+                        <a:spcAft>
+                          <a:spcPts val="200"/>
+                        </a:spcAft>
+                        <a:buNone/>
+                      </a:pPr>
+                      <a:r>
+                        <a:rPr sz="1400">
+                          <a:solidFill>
+                            <a:srgbClr val="111111">
+                              <a:alpha val="100000"/>
+                            </a:srgbClr>
+                          </a:solidFill>
+                          <a:latin typeface="Arial"/>
+                          <a:cs typeface="Arial"/>
+                        </a:rPr>
+                        <a:t>-0.601</a:t>
+                      </a:r>
+                    </a:p>
+                  </a:txBody>
+                  <a:tcPr anchor="ctr" marB="0" marT="0" marR="0" marL="0">
+                    <a:lnL w="0" cmpd="sng" algn="ctr" cap="flat">
+                      <a:solidFill>
+                        <a:srgbClr val="FFFFFF">
+                          <a:alpha val="0"/>
+                        </a:srgbClr>
+                      </a:solidFill>
+                      <a:prstDash val="solid"/>
+                    </a:lnL>
+                    <a:lnR w="0" cmpd="sng" algn="ctr" cap="flat">
+                      <a:solidFill>
+                        <a:srgbClr val="FFFFFF">
+                          <a:alpha val="0"/>
+                        </a:srgbClr>
+                      </a:solidFill>
+                      <a:prstDash val="solid"/>
+                    </a:lnR>
+                    <a:lnT w="0" cmpd="sng" algn="ctr" cap="flat">
+                      <a:solidFill>
+                        <a:srgbClr val="FFFFFF">
+                          <a:alpha val="0"/>
+                        </a:srgbClr>
+                      </a:solidFill>
+                      <a:prstDash val="solid"/>
+                    </a:lnT>
+                    <a:lnB w="0" cmpd="sng" algn="ctr" cap="flat">
+                      <a:solidFill>
+                        <a:srgbClr val="FFFFFF">
+                          <a:alpha val="0"/>
+                        </a:srgbClr>
+                      </a:solidFill>
+                      <a:prstDash val="solid"/>
+                    </a:lnB>
+                  </a:tcPr>
+                </a:tc>
+              </a:tr>
+              <a:tr h="290279">
+                <a:tc>
+                  <a:txBody>
+                    <a:bodyPr/>
+                    <a:lstStyle/>
+                    <a:p>
+                      <a:pPr algn="l" marL="63500" marR="63500">
+                        <a:spcBef>
+                          <a:spcPts val="200"/>
+                        </a:spcBef>
+                        <a:spcAft>
+                          <a:spcPts val="200"/>
+                        </a:spcAft>
+                        <a:buNone/>
+                      </a:pPr>
+                      <a:r>
+                        <a:rPr sz="1400">
+                          <a:solidFill>
+                            <a:srgbClr val="111111">
+                              <a:alpha val="100000"/>
+                            </a:srgbClr>
+                          </a:solidFill>
+                          <a:latin typeface="Arial"/>
+                          <a:cs typeface="Arial"/>
+                        </a:rPr>
+                        <a:t/>
+                      </a:r>
+                    </a:p>
+                  </a:txBody>
+                  <a:tcPr anchor="ctr" marB="0" marT="0" marR="0" marL="0">
+                    <a:lnL w="0" cmpd="sng" algn="ctr" cap="flat">
+                      <a:solidFill>
+                        <a:srgbClr val="FFFFFF">
+                          <a:alpha val="0"/>
+                        </a:srgbClr>
+                      </a:solidFill>
+                      <a:prstDash val="solid"/>
+                    </a:lnL>
+                    <a:lnR w="0" cmpd="sng" algn="ctr" cap="flat">
+                      <a:solidFill>
+                        <a:srgbClr val="FFFFFF">
+                          <a:alpha val="0"/>
+                        </a:srgbClr>
+                      </a:solidFill>
+                      <a:prstDash val="solid"/>
+                    </a:lnR>
+                    <a:lnT w="0" cmpd="sng" algn="ctr" cap="flat">
+                      <a:solidFill>
+                        <a:srgbClr val="FFFFFF">
+                          <a:alpha val="0"/>
+                        </a:srgbClr>
+                      </a:solidFill>
+                      <a:prstDash val="solid"/>
+                    </a:lnT>
+                    <a:lnB w="0" cmpd="sng" algn="ctr" cap="flat">
+                      <a:solidFill>
+                        <a:srgbClr val="FFFFFF">
+                          <a:alpha val="0"/>
+                        </a:srgbClr>
+                      </a:solidFill>
+                      <a:prstDash val="solid"/>
+                    </a:lnB>
+                  </a:tcPr>
+                </a:tc>
+                <a:tc>
+                  <a:txBody>
+                    <a:bodyPr/>
+                    <a:lstStyle/>
+                    <a:p>
+                      <a:pPr algn="ctr" marL="63500" marR="63500">
+                        <a:spcBef>
+                          <a:spcPts val="200"/>
+                        </a:spcBef>
+                        <a:spcAft>
+                          <a:spcPts val="200"/>
+                        </a:spcAft>
+                        <a:buNone/>
+                      </a:pPr>
+                      <a:r>
+                        <a:rPr sz="1400">
+                          <a:solidFill>
+                            <a:srgbClr val="111111">
+                              <a:alpha val="100000"/>
+                            </a:srgbClr>
+                          </a:solidFill>
+                          <a:latin typeface="Arial"/>
+                          <a:cs typeface="Arial"/>
+                        </a:rPr>
+                        <a:t>(0.436)</a:t>
+                      </a:r>
+                    </a:p>
+                  </a:txBody>
+                  <a:tcPr anchor="ctr" marB="0" marT="0" marR="0" marL="0">
+                    <a:lnL w="0" cmpd="sng" algn="ctr" cap="flat">
+                      <a:solidFill>
+                        <a:srgbClr val="FFFFFF">
+                          <a:alpha val="0"/>
+                        </a:srgbClr>
+                      </a:solidFill>
+                      <a:prstDash val="solid"/>
+                    </a:lnL>
+                    <a:lnR w="0" cmpd="sng" algn="ctr" cap="flat">
+                      <a:solidFill>
+                        <a:srgbClr val="FFFFFF">
+                          <a:alpha val="0"/>
+                        </a:srgbClr>
+                      </a:solidFill>
+                      <a:prstDash val="solid"/>
+                    </a:lnR>
+                    <a:lnT w="0" cmpd="sng" algn="ctr" cap="flat">
+                      <a:solidFill>
+                        <a:srgbClr val="FFFFFF">
+                          <a:alpha val="0"/>
+                        </a:srgbClr>
+                      </a:solidFill>
+                      <a:prstDash val="solid"/>
+                    </a:lnT>
+                    <a:lnB w="0" cmpd="sng" algn="ctr" cap="flat">
+                      <a:solidFill>
+                        <a:srgbClr val="FFFFFF">
+                          <a:alpha val="0"/>
+                        </a:srgbClr>
+                      </a:solidFill>
+                      <a:prstDash val="solid"/>
+                    </a:lnB>
+                  </a:tcPr>
+                </a:tc>
+              </a:tr>
+              <a:tr h="262584">
+                <a:tc>
+                  <a:txBody>
+                    <a:bodyPr/>
+                    <a:lstStyle/>
+                    <a:p>
+                      <a:pPr algn="l" marL="63500" marR="63500">
+                        <a:spcBef>
+                          <a:spcPts val="200"/>
+                        </a:spcBef>
+                        <a:spcAft>
+                          <a:spcPts val="200"/>
+                        </a:spcAft>
+                        <a:buNone/>
+                      </a:pPr>
+                      <a:r>
+                        <a:rPr sz="1400">
+                          <a:solidFill>
+                            <a:srgbClr val="111111">
+                              <a:alpha val="100000"/>
+                            </a:srgbClr>
+                          </a:solidFill>
+                          <a:latin typeface="Arial"/>
+                          <a:cs typeface="Arial"/>
+                        </a:rPr>
+                        <a:t>Loss X P-Score</a:t>
+                      </a:r>
+                    </a:p>
+                  </a:txBody>
+                  <a:tcPr anchor="ctr" marB="0" marT="0" marR="0" marL="0">
+                    <a:lnL w="0" cmpd="sng" algn="ctr" cap="flat">
+                      <a:solidFill>
+                        <a:srgbClr val="FFFFFF">
+                          <a:alpha val="0"/>
+                        </a:srgbClr>
+                      </a:solidFill>
+                      <a:prstDash val="solid"/>
+                    </a:lnL>
+                    <a:lnR w="0" cmpd="sng" algn="ctr" cap="flat">
+                      <a:solidFill>
+                        <a:srgbClr val="FFFFFF">
+                          <a:alpha val="0"/>
+                        </a:srgbClr>
+                      </a:solidFill>
+                      <a:prstDash val="solid"/>
+                    </a:lnR>
+                    <a:lnT w="0" cmpd="sng" algn="ctr" cap="flat">
+                      <a:solidFill>
+                        <a:srgbClr val="FFFFFF">
+                          <a:alpha val="0"/>
+                        </a:srgbClr>
+                      </a:solidFill>
+                      <a:prstDash val="solid"/>
+                    </a:lnT>
+                    <a:lnB w="0" cmpd="sng" algn="ctr" cap="flat">
+                      <a:solidFill>
+                        <a:srgbClr val="FFFFFF">
+                          <a:alpha val="0"/>
+                        </a:srgbClr>
+                      </a:solidFill>
+                      <a:prstDash val="solid"/>
+                    </a:lnB>
+                  </a:tcPr>
+                </a:tc>
+                <a:tc>
+                  <a:txBody>
+                    <a:bodyPr/>
+                    <a:lstStyle/>
+                    <a:p>
+                      <a:pPr algn="ctr" marL="63500" marR="63500">
+                        <a:spcBef>
+                          <a:spcPts val="200"/>
+                        </a:spcBef>
+                        <a:spcAft>
+                          <a:spcPts val="200"/>
+                        </a:spcAft>
+                        <a:buNone/>
+                      </a:pPr>
+                      <a:r>
+                        <a:rPr sz="1400">
+                          <a:solidFill>
+                            <a:srgbClr val="111111">
+                              <a:alpha val="100000"/>
+                            </a:srgbClr>
+                          </a:solidFill>
+                          <a:latin typeface="Arial"/>
+                          <a:cs typeface="Arial"/>
+                        </a:rPr>
+                        <a:t>0.077</a:t>
+                      </a:r>
+                    </a:p>
+                  </a:txBody>
+                  <a:tcPr anchor="ctr" marB="0" marT="0" marR="0" marL="0">
+                    <a:lnL w="0" cmpd="sng" algn="ctr" cap="flat">
+                      <a:solidFill>
+                        <a:srgbClr val="FFFFFF">
+                          <a:alpha val="0"/>
+                        </a:srgbClr>
+                      </a:solidFill>
+                      <a:prstDash val="solid"/>
+                    </a:lnL>
+                    <a:lnR w="0" cmpd="sng" algn="ctr" cap="flat">
+                      <a:solidFill>
+                        <a:srgbClr val="FFFFFF">
+                          <a:alpha val="0"/>
+                        </a:srgbClr>
+                      </a:solidFill>
+                      <a:prstDash val="solid"/>
+                    </a:lnR>
+                    <a:lnT w="0" cmpd="sng" algn="ctr" cap="flat">
+                      <a:solidFill>
+                        <a:srgbClr val="FFFFFF">
+                          <a:alpha val="0"/>
+                        </a:srgbClr>
+                      </a:solidFill>
+                      <a:prstDash val="solid"/>
+                    </a:lnT>
+                    <a:lnB w="0" cmpd="sng" algn="ctr" cap="flat">
+                      <a:solidFill>
+                        <a:srgbClr val="FFFFFF">
+                          <a:alpha val="0"/>
+                        </a:srgbClr>
+                      </a:solidFill>
+                      <a:prstDash val="solid"/>
+                    </a:lnB>
+                  </a:tcPr>
+                </a:tc>
+              </a:tr>
+              <a:tr h="290279">
+                <a:tc>
+                  <a:txBody>
+                    <a:bodyPr/>
+                    <a:lstStyle/>
+                    <a:p>
+                      <a:pPr algn="l" marL="63500" marR="63500">
+                        <a:spcBef>
+                          <a:spcPts val="200"/>
+                        </a:spcBef>
+                        <a:spcAft>
+                          <a:spcPts val="200"/>
+                        </a:spcAft>
+                        <a:buNone/>
+                      </a:pPr>
+                      <a:r>
+                        <a:rPr sz="1400">
+                          <a:solidFill>
+                            <a:srgbClr val="111111">
+                              <a:alpha val="100000"/>
+                            </a:srgbClr>
+                          </a:solidFill>
+                          <a:latin typeface="Arial"/>
+                          <a:cs typeface="Arial"/>
+                        </a:rPr>
+                        <a:t/>
+                      </a:r>
+                    </a:p>
+                  </a:txBody>
+                  <a:tcPr anchor="ctr" marB="0" marT="0" marR="0" marL="0">
+                    <a:lnL w="0" cmpd="sng" algn="ctr" cap="flat">
+                      <a:solidFill>
+                        <a:srgbClr val="FFFFFF">
+                          <a:alpha val="0"/>
+                        </a:srgbClr>
+                      </a:solidFill>
+                      <a:prstDash val="solid"/>
+                    </a:lnL>
+                    <a:lnR w="0" cmpd="sng" algn="ctr" cap="flat">
+                      <a:solidFill>
+                        <a:srgbClr val="FFFFFF">
+                          <a:alpha val="0"/>
+                        </a:srgbClr>
+                      </a:solidFill>
+                      <a:prstDash val="solid"/>
+                    </a:lnR>
+                    <a:lnT w="0" cmpd="sng" algn="ctr" cap="flat">
+                      <a:solidFill>
+                        <a:srgbClr val="FFFFFF">
+                          <a:alpha val="0"/>
+                        </a:srgbClr>
+                      </a:solidFill>
+                      <a:prstDash val="solid"/>
+                    </a:lnT>
+                    <a:lnB w="0" cmpd="sng" algn="ctr" cap="flat">
+                      <a:solidFill>
+                        <a:srgbClr val="FFFFFF">
+                          <a:alpha val="0"/>
+                        </a:srgbClr>
+                      </a:solidFill>
+                      <a:prstDash val="solid"/>
+                    </a:lnB>
+                  </a:tcPr>
+                </a:tc>
+                <a:tc>
+                  <a:txBody>
+                    <a:bodyPr/>
+                    <a:lstStyle/>
+                    <a:p>
+                      <a:pPr algn="ctr" marL="63500" marR="63500">
+                        <a:spcBef>
+                          <a:spcPts val="200"/>
+                        </a:spcBef>
+                        <a:spcAft>
+                          <a:spcPts val="200"/>
+                        </a:spcAft>
+                        <a:buNone/>
+                      </a:pPr>
+                      <a:r>
+                        <a:rPr sz="1400">
+                          <a:solidFill>
+                            <a:srgbClr val="111111">
+                              <a:alpha val="100000"/>
+                            </a:srgbClr>
+                          </a:solidFill>
+                          <a:latin typeface="Arial"/>
+                          <a:cs typeface="Arial"/>
+                        </a:rPr>
+                        <a:t>(0.233)</a:t>
+                      </a:r>
+                    </a:p>
+                  </a:txBody>
+                  <a:tcPr anchor="ctr" marB="0" marT="0" marR="0" marL="0">
+                    <a:lnL w="0" cmpd="sng" algn="ctr" cap="flat">
+                      <a:solidFill>
+                        <a:srgbClr val="FFFFFF">
+                          <a:alpha val="0"/>
+                        </a:srgbClr>
+                      </a:solidFill>
+                      <a:prstDash val="solid"/>
+                    </a:lnL>
+                    <a:lnR w="0" cmpd="sng" algn="ctr" cap="flat">
+                      <a:solidFill>
+                        <a:srgbClr val="FFFFFF">
+                          <a:alpha val="0"/>
+                        </a:srgbClr>
+                      </a:solidFill>
+                      <a:prstDash val="solid"/>
+                    </a:lnR>
+                    <a:lnT w="0" cmpd="sng" algn="ctr" cap="flat">
+                      <a:solidFill>
+                        <a:srgbClr val="FFFFFF">
+                          <a:alpha val="0"/>
+                        </a:srgbClr>
+                      </a:solidFill>
+                      <a:prstDash val="solid"/>
+                    </a:lnT>
+                    <a:lnB w="0" cmpd="sng" algn="ctr" cap="flat">
+                      <a:solidFill>
+                        <a:srgbClr val="FFFFFF">
+                          <a:alpha val="0"/>
+                        </a:srgbClr>
+                      </a:solidFill>
+                      <a:prstDash val="solid"/>
+                    </a:lnB>
+                  </a:tcPr>
+                </a:tc>
+              </a:tr>
+              <a:tr h="288982">
+                <a:tc>
+                  <a:txBody>
+                    <a:bodyPr/>
+                    <a:lstStyle/>
+                    <a:p>
+                      <a:pPr algn="l" marL="63500" marR="63500">
+                        <a:spcBef>
+                          <a:spcPts val="200"/>
+                        </a:spcBef>
+                        <a:spcAft>
+                          <a:spcPts val="200"/>
+                        </a:spcAft>
+                        <a:buNone/>
+                      </a:pPr>
+                      <a:r>
+                        <a:rPr sz="1400">
+                          <a:solidFill>
+                            <a:srgbClr val="111111">
+                              <a:alpha val="100000"/>
+                            </a:srgbClr>
+                          </a:solidFill>
+                          <a:latin typeface="Arial"/>
+                          <a:cs typeface="Arial"/>
+                        </a:rPr>
+                        <a:t>Adjusted R2</a:t>
+                      </a:r>
+                    </a:p>
+                  </a:txBody>
+                  <a:tcPr anchor="ctr" marB="0" marT="0" marR="0" marL="0">
+                    <a:lnL w="0" cmpd="sng" algn="ctr" cap="flat">
+                      <a:solidFill>
+                        <a:srgbClr val="FFFFFF">
+                          <a:alpha val="0"/>
+                        </a:srgbClr>
+                      </a:solidFill>
+                      <a:prstDash val="solid"/>
+                    </a:lnL>
+                    <a:lnR w="0" cmpd="sng" algn="ctr" cap="flat">
+                      <a:solidFill>
+                        <a:srgbClr val="FFFFFF">
+                          <a:alpha val="0"/>
+                        </a:srgbClr>
+                      </a:solidFill>
+                      <a:prstDash val="solid"/>
+                    </a:lnR>
+                    <a:lnT w="0" cmpd="sng" algn="ctr" cap="flat">
+                      <a:solidFill>
+                        <a:srgbClr val="FFFFFF">
+                          <a:alpha val="0"/>
+                        </a:srgbClr>
+                      </a:solidFill>
+                      <a:prstDash val="solid"/>
+                    </a:lnT>
+                    <a:lnB w="0" cmpd="sng" algn="ctr" cap="flat">
+                      <a:solidFill>
+                        <a:srgbClr val="FFFFFF">
+                          <a:alpha val="0"/>
+                        </a:srgbClr>
+                      </a:solidFill>
+                      <a:prstDash val="solid"/>
+                    </a:lnB>
+                  </a:tcPr>
+                </a:tc>
+                <a:tc>
+                  <a:txBody>
+                    <a:bodyPr/>
+                    <a:lstStyle/>
+                    <a:p>
+                      <a:pPr algn="ctr" marL="63500" marR="63500">
+                        <a:spcBef>
+                          <a:spcPts val="200"/>
+                        </a:spcBef>
+                        <a:spcAft>
+                          <a:spcPts val="200"/>
+                        </a:spcAft>
+                        <a:buNone/>
+                      </a:pPr>
+                      <a:r>
+                        <a:rPr sz="1400">
+                          <a:solidFill>
+                            <a:srgbClr val="111111">
+                              <a:alpha val="100000"/>
+                            </a:srgbClr>
+                          </a:solidFill>
+                          <a:latin typeface="Arial"/>
+                          <a:cs typeface="Arial"/>
+                        </a:rPr>
+                        <a:t>0.007</a:t>
+                      </a:r>
+                    </a:p>
+                  </a:txBody>
+                  <a:tcPr anchor="ctr" marB="0" marT="0" marR="0" marL="0">
+                    <a:lnL w="0" cmpd="sng" algn="ctr" cap="flat">
+                      <a:solidFill>
+                        <a:srgbClr val="FFFFFF">
+                          <a:alpha val="0"/>
+                        </a:srgbClr>
+                      </a:solidFill>
+                      <a:prstDash val="solid"/>
+                    </a:lnL>
+                    <a:lnR w="0" cmpd="sng" algn="ctr" cap="flat">
+                      <a:solidFill>
+                        <a:srgbClr val="FFFFFF">
+                          <a:alpha val="0"/>
+                        </a:srgbClr>
+                      </a:solidFill>
+                      <a:prstDash val="solid"/>
+                    </a:lnR>
+                    <a:lnT w="0" cmpd="sng" algn="ctr" cap="flat">
+                      <a:solidFill>
+                        <a:srgbClr val="FFFFFF">
+                          <a:alpha val="0"/>
+                        </a:srgbClr>
+                      </a:solidFill>
+                      <a:prstDash val="solid"/>
+                    </a:lnT>
+                    <a:lnB w="0" cmpd="sng" algn="ctr" cap="flat">
+                      <a:solidFill>
+                        <a:srgbClr val="FFFFFF">
+                          <a:alpha val="0"/>
+                        </a:srgbClr>
+                      </a:solidFill>
+                      <a:prstDash val="solid"/>
+                    </a:lnB>
+                  </a:tcPr>
+                </a:tc>
+              </a:tr>
+              <a:tr h="259583">
+                <a:tc>
+                  <a:txBody>
+                    <a:bodyPr/>
+                    <a:lstStyle/>
+                    <a:p>
+                      <a:pPr algn="l" marL="63500" marR="63500">
+                        <a:spcBef>
+                          <a:spcPts val="200"/>
+                        </a:spcBef>
+                        <a:spcAft>
+                          <a:spcPts val="200"/>
+                        </a:spcAft>
+                        <a:buNone/>
+                      </a:pPr>
+                      <a:r>
+                        <a:rPr sz="1400">
+                          <a:solidFill>
+                            <a:srgbClr val="111111">
+                              <a:alpha val="100000"/>
+                            </a:srgbClr>
+                          </a:solidFill>
+                          <a:latin typeface="Arial"/>
+                          <a:cs typeface="Arial"/>
+                        </a:rPr>
+                        <a:t>N</a:t>
+                      </a:r>
+                    </a:p>
+                  </a:txBody>
+                  <a:tcPr anchor="ctr" marB="0" marT="0" marR="0" marL="0">
+                    <a:lnL w="0" cmpd="sng" algn="ctr" cap="flat">
+                      <a:solidFill>
+                        <a:srgbClr val="FFFFFF">
+                          <a:alpha val="0"/>
+                        </a:srgbClr>
+                      </a:solidFill>
+                      <a:prstDash val="solid"/>
+                    </a:lnL>
+                    <a:lnR w="0" cmpd="sng" algn="ctr" cap="flat">
+                      <a:solidFill>
+                        <a:srgbClr val="FFFFFF">
+                          <a:alpha val="0"/>
+                        </a:srgbClr>
+                      </a:solidFill>
+                      <a:prstDash val="solid"/>
+                    </a:lnR>
+                    <a:lnT w="0" cmpd="sng" algn="ctr" cap="flat">
+                      <a:solidFill>
+                        <a:srgbClr val="FFFFFF">
+                          <a:alpha val="0"/>
+                        </a:srgbClr>
+                      </a:solidFill>
+                      <a:prstDash val="solid"/>
+                    </a:lnT>
+                    <a:lnB w="12700" cmpd="sng" algn="ctr" cap="flat">
+                      <a:solidFill>
+                        <a:srgbClr val="000000">
+                          <a:alpha val="100000"/>
+                        </a:srgbClr>
+                      </a:solidFill>
+                      <a:prstDash val="solid"/>
+                    </a:lnB>
+                  </a:tcPr>
+                </a:tc>
+                <a:tc>
+                  <a:txBody>
+                    <a:bodyPr/>
+                    <a:lstStyle/>
+                    <a:p>
+                      <a:pPr algn="ctr" marL="63500" marR="63500">
+                        <a:spcBef>
+                          <a:spcPts val="200"/>
+                        </a:spcBef>
+                        <a:spcAft>
+                          <a:spcPts val="200"/>
+                        </a:spcAft>
+                        <a:buNone/>
+                      </a:pPr>
+                      <a:r>
+                        <a:rPr sz="1400">
+                          <a:solidFill>
+                            <a:srgbClr val="111111">
+                              <a:alpha val="100000"/>
+                            </a:srgbClr>
+                          </a:solidFill>
+                          <a:latin typeface="Arial"/>
+                          <a:cs typeface="Arial"/>
+                        </a:rPr>
+                        <a:t>2421</a:t>
+                      </a:r>
+                    </a:p>
+                  </a:txBody>
+                  <a:tcPr anchor="ctr" marB="0" marT="0" marR="0" marL="0">
+                    <a:lnL w="0" cmpd="sng" algn="ctr" cap="flat">
+                      <a:solidFill>
+                        <a:srgbClr val="FFFFFF">
+                          <a:alpha val="0"/>
+                        </a:srgbClr>
+                      </a:solidFill>
+                      <a:prstDash val="solid"/>
+                    </a:lnL>
+                    <a:lnR w="0" cmpd="sng" algn="ctr" cap="flat">
+                      <a:solidFill>
+                        <a:srgbClr val="FFFFFF">
+                          <a:alpha val="0"/>
+                        </a:srgbClr>
+                      </a:solidFill>
+                      <a:prstDash val="solid"/>
+                    </a:lnR>
+                    <a:lnT w="0" cmpd="sng" algn="ctr" cap="flat">
+                      <a:solidFill>
+                        <a:srgbClr val="FFFFFF">
+                          <a:alpha val="0"/>
+                        </a:srgbClr>
+                      </a:solidFill>
+                      <a:prstDash val="solid"/>
+                    </a:lnT>
+                    <a:lnB w="12700" cmpd="sng" algn="ctr" cap="flat">
+                      <a:solidFill>
+                        <a:srgbClr val="000000">
+                          <a:alpha val="100000"/>
+                        </a:srgbClr>
+                      </a:solidFill>
+                      <a:prstDash val="solid"/>
+                    </a:lnB>
+                  </a:tcPr>
+                </a:tc>
+              </a:tr>
+              <a:tr h="210627">
+                <a:tc gridSpan="2">
+                  <a:txBody>
+                    <a:bodyPr/>
+                    <a:lstStyle/>
+                    <a:p>
+                      <a:pPr algn="l" marL="0" marR="0">
+                        <a:spcBef>
+                          <a:spcPts val="0"/>
+                        </a:spcBef>
+                        <a:spcAft>
+                          <a:spcPts val="0"/>
+                        </a:spcAft>
+                        <a:buNone/>
+                      </a:pPr>
+                      <a:r>
+                        <a:rPr sz="1400">
+                          <a:solidFill>
+                            <a:srgbClr val="000000">
+                              <a:alpha val="100000"/>
+                            </a:srgbClr>
+                          </a:solidFill>
+                          <a:latin typeface="Arial"/>
+                          <a:cs typeface="Arial"/>
+                        </a:rPr>
+                        <a:t>*** Significance at 1% level</a:t>
+                      </a:r>
+                    </a:p>
+                  </a:txBody>
+                  <a:tcPr anchor="ctr" marB="0" marT="0" marR="0" marL="0">
+                    <a:lnL w="0" cmpd="sng" algn="ctr" cap="flat">
+                      <a:solidFill>
+                        <a:srgbClr val="FFFFFF">
+                          <a:alpha val="0"/>
+                        </a:srgbClr>
+                      </a:solidFill>
+                      <a:prstDash val="solid"/>
+                    </a:lnL>
+                    <a:lnR w="0" cmpd="sng" algn="ctr" cap="flat">
+                      <a:solidFill>
+                        <a:srgbClr val="FFFFFF">
+                          <a:alpha val="0"/>
+                        </a:srgbClr>
+                      </a:solidFill>
+                      <a:prstDash val="solid"/>
+                    </a:lnR>
+                    <a:lnT w="0" cmpd="sng" algn="ctr" cap="flat">
+                      <a:solidFill>
+                        <a:srgbClr val="FFFFFF">
+                          <a:alpha val="0"/>
+                        </a:srgbClr>
+                      </a:solidFill>
+                      <a:prstDash val="solid"/>
+                    </a:lnT>
+                    <a:lnB w="0" cmpd="sng" algn="ctr" cap="flat">
+                      <a:solidFill>
+                        <a:srgbClr val="FFFFFF">
+                          <a:alpha val="0"/>
+                        </a:srgbClr>
+                      </a:solidFill>
+                      <a:prstDash val="solid"/>
+                    </a:lnB>
+                  </a:tcPr>
+                </a:tc>
+                <a:tc hMerge="true">
+                  <a:txBody>
+                    <a:bodyPr/>
+                    <a:lstStyle/>
+                    <a:p>
+                      <a:pPr algn="ctr" marL="0" marR="0">
+                        <a:spcBef>
+                          <a:spcPts val="0"/>
+                        </a:spcBef>
+                        <a:spcAft>
+                          <a:spcPts val="0"/>
+                        </a:spcAft>
+                        <a:buNone/>
+                      </a:pPr>
+                      <a:r>
+                        <a:rPr sz="1400">
+                          <a:solidFill>
+                            <a:srgbClr val="000000">
+                              <a:alpha val="100000"/>
+                            </a:srgbClr>
+                          </a:solidFill>
+                          <a:latin typeface="Arial"/>
+                          <a:cs typeface="Arial"/>
+                        </a:rPr>
+                        <a:t>*** Significance at 1% level</a:t>
+                      </a:r>
+                    </a:p>
+                  </a:txBody>
+                  <a:tcPr anchor="ctr" marB="0" marT="0" marR="0" marL="0">
+                    <a:lnL w="0" cmpd="sng" algn="ctr" cap="flat">
+                      <a:solidFill>
+                        <a:srgbClr val="FFFFFF">
+                          <a:alpha val="0"/>
+                        </a:srgbClr>
+                      </a:solidFill>
+                      <a:prstDash val="solid"/>
+                    </a:lnL>
+                    <a:lnR w="0" cmpd="sng" algn="ctr" cap="flat">
+                      <a:solidFill>
+                        <a:srgbClr val="FFFFFF">
+                          <a:alpha val="0"/>
+                        </a:srgbClr>
+                      </a:solidFill>
+                      <a:prstDash val="solid"/>
+                    </a:lnR>
+                    <a:lnT w="0" cmpd="sng" algn="ctr" cap="flat">
+                      <a:solidFill>
+                        <a:srgbClr val="FFFFFF">
+                          <a:alpha val="0"/>
+                        </a:srgbClr>
+                      </a:solidFill>
+                      <a:prstDash val="solid"/>
+                    </a:lnT>
+                    <a:lnB w="0" cmpd="sng" algn="ctr" cap="flat">
+                      <a:solidFill>
+                        <a:srgbClr val="FFFFFF">
+                          <a:alpha val="0"/>
+                        </a:srgbClr>
+                      </a:solidFill>
+                      <a:prstDash val="solid"/>
+                    </a:lnB>
+                  </a:tcPr>
+                </a:tc>
+              </a:tr>
+              <a:tr h="210627">
+                <a:tc gridSpan="2">
+                  <a:txBody>
+                    <a:bodyPr/>
+                    <a:lstStyle/>
+                    <a:p>
+                      <a:pPr algn="l" marL="0" marR="0">
+                        <a:spcBef>
+                          <a:spcPts val="0"/>
+                        </a:spcBef>
+                        <a:spcAft>
+                          <a:spcPts val="0"/>
+                        </a:spcAft>
+                        <a:buNone/>
+                      </a:pPr>
+                      <a:r>
+                        <a:rPr sz="1400">
+                          <a:solidFill>
+                            <a:srgbClr val="000000">
+                              <a:alpha val="100000"/>
+                            </a:srgbClr>
+                          </a:solidFill>
+                          <a:latin typeface="Arial"/>
+                          <a:cs typeface="Arial"/>
+                        </a:rPr>
+                        <a:t>** Significance at 5% level</a:t>
+                      </a:r>
+                    </a:p>
+                  </a:txBody>
+                  <a:tcPr anchor="ctr" marB="0" marT="0" marR="0" marL="0">
+                    <a:lnL w="0" cmpd="sng" algn="ctr" cap="flat">
+                      <a:solidFill>
+                        <a:srgbClr val="FFFFFF">
+                          <a:alpha val="0"/>
+                        </a:srgbClr>
+                      </a:solidFill>
+                      <a:prstDash val="solid"/>
+                    </a:lnL>
+                    <a:lnR w="0" cmpd="sng" algn="ctr" cap="flat">
+                      <a:solidFill>
+                        <a:srgbClr val="FFFFFF">
+                          <a:alpha val="0"/>
+                        </a:srgbClr>
+                      </a:solidFill>
+                      <a:prstDash val="solid"/>
+                    </a:lnR>
+                    <a:lnT w="0" cmpd="sng" algn="ctr" cap="flat">
+                      <a:solidFill>
+                        <a:srgbClr val="FFFFFF">
+                          <a:alpha val="0"/>
+                        </a:srgbClr>
+                      </a:solidFill>
+                      <a:prstDash val="solid"/>
+                    </a:lnT>
+                    <a:lnB w="0" cmpd="sng" algn="ctr" cap="flat">
+                      <a:solidFill>
+                        <a:srgbClr val="FFFFFF">
+                          <a:alpha val="0"/>
+                        </a:srgbClr>
+                      </a:solidFill>
+                      <a:prstDash val="solid"/>
+                    </a:lnB>
+                  </a:tcPr>
+                </a:tc>
+                <a:tc hMerge="true">
+                  <a:txBody>
+                    <a:bodyPr/>
+                    <a:lstStyle/>
+                    <a:p>
+                      <a:pPr algn="ctr" marL="0" marR="0">
+                        <a:spcBef>
+                          <a:spcPts val="0"/>
+                        </a:spcBef>
+                        <a:spcAft>
+                          <a:spcPts val="0"/>
+                        </a:spcAft>
+                        <a:buNone/>
+                      </a:pPr>
+                      <a:r>
+                        <a:rPr sz="1400">
+                          <a:solidFill>
+                            <a:srgbClr val="000000">
+                              <a:alpha val="100000"/>
+                            </a:srgbClr>
+                          </a:solidFill>
+                          <a:latin typeface="Arial"/>
+                          <a:cs typeface="Arial"/>
+                        </a:rPr>
+                        <a:t>** Significance at 5% level</a:t>
+                      </a:r>
+                    </a:p>
+                  </a:txBody>
+                  <a:tcPr anchor="ctr" marB="0" marT="0" marR="0" marL="0">
+                    <a:lnL w="0" cmpd="sng" algn="ctr" cap="flat">
+                      <a:solidFill>
+                        <a:srgbClr val="FFFFFF">
+                          <a:alpha val="0"/>
+                        </a:srgbClr>
+                      </a:solidFill>
+                      <a:prstDash val="solid"/>
+                    </a:lnL>
+                    <a:lnR w="0" cmpd="sng" algn="ctr" cap="flat">
+                      <a:solidFill>
+                        <a:srgbClr val="FFFFFF">
+                          <a:alpha val="0"/>
+                        </a:srgbClr>
+                      </a:solidFill>
+                      <a:prstDash val="solid"/>
+                    </a:lnR>
+                    <a:lnT w="0" cmpd="sng" algn="ctr" cap="flat">
+                      <a:solidFill>
+                        <a:srgbClr val="FFFFFF">
+                          <a:alpha val="0"/>
+                        </a:srgbClr>
+                      </a:solidFill>
+                      <a:prstDash val="solid"/>
+                    </a:lnT>
+                    <a:lnB w="0" cmpd="sng" algn="ctr" cap="flat">
+                      <a:solidFill>
+                        <a:srgbClr val="FFFFFF">
+                          <a:alpha val="0"/>
+                        </a:srgbClr>
+                      </a:solidFill>
+                      <a:prstDash val="solid"/>
+                    </a:lnB>
+                  </a:tcPr>
+                </a:tc>
+              </a:tr>
+              <a:tr h="210627">
+                <a:tc gridSpan="2">
+                  <a:txBody>
+                    <a:bodyPr/>
+                    <a:lstStyle/>
+                    <a:p>
+                      <a:pPr algn="l" marL="0" marR="0">
+                        <a:spcBef>
+                          <a:spcPts val="0"/>
+                        </a:spcBef>
+                        <a:spcAft>
+                          <a:spcPts val="0"/>
+                        </a:spcAft>
+                        <a:buNone/>
+                      </a:pPr>
+                      <a:r>
+                        <a:rPr sz="1400">
+                          <a:solidFill>
+                            <a:srgbClr val="000000">
+                              <a:alpha val="100000"/>
+                            </a:srgbClr>
+                          </a:solidFill>
+                          <a:latin typeface="Arial"/>
+                          <a:cs typeface="Arial"/>
+                        </a:rPr>
+                        <a:t>* Significance at 10% level</a:t>
+                      </a:r>
+                    </a:p>
+                  </a:txBody>
+                  <a:tcPr anchor="ctr" marB="0" marT="0" marR="0" marL="0">
+                    <a:lnL w="0" cmpd="sng" algn="ctr" cap="flat">
+                      <a:solidFill>
+                        <a:srgbClr val="FFFFFF">
+                          <a:alpha val="0"/>
+                        </a:srgbClr>
+                      </a:solidFill>
+                      <a:prstDash val="solid"/>
+                    </a:lnL>
+                    <a:lnR w="0" cmpd="sng" algn="ctr" cap="flat">
+                      <a:solidFill>
+                        <a:srgbClr val="FFFFFF">
+                          <a:alpha val="0"/>
+                        </a:srgbClr>
+                      </a:solidFill>
+                      <a:prstDash val="solid"/>
+                    </a:lnR>
+                    <a:lnT w="0" cmpd="sng" algn="ctr" cap="flat">
+                      <a:solidFill>
+                        <a:srgbClr val="FFFFFF">
+                          <a:alpha val="0"/>
+                        </a:srgbClr>
+                      </a:solidFill>
+                      <a:prstDash val="solid"/>
+                    </a:lnT>
+                    <a:lnB w="0" cmpd="sng" algn="ctr" cap="flat">
+                      <a:solidFill>
+                        <a:srgbClr val="FFFFFF">
+                          <a:alpha val="0"/>
+                        </a:srgbClr>
+                      </a:solidFill>
+                      <a:prstDash val="solid"/>
+                    </a:lnB>
+                  </a:tcPr>
+                </a:tc>
+                <a:tc hMerge="true">
+                  <a:txBody>
+                    <a:bodyPr/>
+                    <a:lstStyle/>
+                    <a:p>
+                      <a:pPr algn="ctr" marL="0" marR="0">
+                        <a:spcBef>
+                          <a:spcPts val="0"/>
+                        </a:spcBef>
+                        <a:spcAft>
+                          <a:spcPts val="0"/>
+                        </a:spcAft>
+                        <a:buNone/>
+                      </a:pPr>
+                      <a:r>
+                        <a:rPr sz="1400">
+                          <a:solidFill>
+                            <a:srgbClr val="000000">
+                              <a:alpha val="100000"/>
+                            </a:srgbClr>
+                          </a:solidFill>
+                          <a:latin typeface="Arial"/>
+                          <a:cs typeface="Arial"/>
+                        </a:rPr>
+                        <a:t>* Significance at 10% level</a:t>
+                      </a:r>
+                    </a:p>
+                  </a:txBody>
+                  <a:tcPr anchor="ctr" marB="0" marT="0" marR="0" marL="0">
+                    <a:lnL w="0" cmpd="sng" algn="ctr" cap="flat">
+                      <a:solidFill>
+                        <a:srgbClr val="FFFFFF">
+                          <a:alpha val="0"/>
+                        </a:srgbClr>
+                      </a:solidFill>
+                      <a:prstDash val="solid"/>
+                    </a:lnL>
+                    <a:lnR w="0" cmpd="sng" algn="ctr" cap="flat">
+                      <a:solidFill>
+                        <a:srgbClr val="FFFFFF">
+                          <a:alpha val="0"/>
+                        </a:srgbClr>
+                      </a:solidFill>
+                      <a:prstDash val="solid"/>
+                    </a:lnR>
+                    <a:lnT w="0" cmpd="sng" algn="ctr" cap="flat">
+                      <a:solidFill>
+                        <a:srgbClr val="FFFFFF">
+                          <a:alpha val="0"/>
+                        </a:srgbClr>
+                      </a:solidFill>
+                      <a:prstDash val="solid"/>
+                    </a:lnT>
+                    <a:lnB w="0" cmpd="sng" algn="ctr" cap="flat">
+                      <a:solidFill>
+                        <a:srgbClr val="FFFFFF">
+                          <a:alpha val="0"/>
+                        </a:srgbClr>
+                      </a:solidFill>
+                      <a:prstDash val="solid"/>
+                    </a:lnB>
+                  </a:tcPr>
+                </a:tc>
+              </a:tr>
+            </a:tbl>
+          </a:graphicData>
+        </a:graphic>
+      </p:graphicFrame>
+    </p:spTree>
+  </p:cSld>
+</p:sld>
+</file>
+
 <file path=ppt/slides/slide2.xml><?xml version="1.0" encoding="utf-8"?>
 <p:sld xmlns:a="http://schemas.openxmlformats.org/drawingml/2006/main" xmlns:r="http://schemas.openxmlformats.org/officeDocument/2006/relationships" xmlns:p="http://schemas.openxmlformats.org/presentationml/2006/main">
   <p:cSld>
@@ -3752,6 +6390,972 @@
           </a:p>
         </p:txBody>
       </p:sp>
+    </p:spTree>
+  </p:cSld>
+</p:sld>
+</file>
+
+<file path=ppt/slides/slide4.xml><?xml version="1.0" encoding="utf-8"?>
+<p:sld xmlns:a="http://schemas.openxmlformats.org/drawingml/2006/main" xmlns:r="http://schemas.openxmlformats.org/officeDocument/2006/relationships" xmlns:p="http://schemas.openxmlformats.org/presentationml/2006/main">
+  <p:cSld>
+    <p:spTree>
+      <p:nvGrpSpPr>
+        <p:cNvPr id="1" name=""/>
+        <p:cNvGrpSpPr/>
+        <p:nvPr/>
+      </p:nvGrpSpPr>
+      <p:grpSpPr>
+        <a:xfrm>
+          <a:off x="0" y="0"/>
+          <a:ext cx="0" cy="0"/>
+          <a:chOff x="0" y="0"/>
+          <a:chExt cx="0" cy="0"/>
+        </a:xfrm>
+      </p:grpSpPr>
+      <p:sp>
+        <p:nvSpPr>
+          <p:cNvPr id="2" name="タイトル 1"/>
+          <p:cNvSpPr>
+            <a:spLocks noGrp="1"/>
+          </p:cNvSpPr>
+          <p:nvPr>
+            <p:ph type="title"/>
+          </p:nvPr>
+        </p:nvSpPr>
+        <p:spPr>
+          <a:xfrm>
+            <a:off x="528547" y="447705"/>
+            <a:ext cx="8229600" cy="838338"/>
+          </a:xfrm>
+        </p:spPr>
+        <p:txBody>
+          <a:bodyPr/>
+          <a:lstStyle/>
+          <a:p>
+            <a:pPr lvl="0" marL="0" indent="0">
+              <a:buNone/>
+            </a:pPr>
+            <a:r>
+              <a:rPr/>
+              <a:t>税控除の割合</a:t>
+            </a:r>
+          </a:p>
+        </p:txBody>
+      </p:sp>
+      <p:pic>
+        <p:nvPicPr>
+          <p:cNvPr descr="C:/Users/vge00/Desktop/NaSTaB/report/200710Meeting_files/figure-pptx/dedcution_rate-1.png" id="0" name="Picture 1"/>
+          <p:cNvPicPr>
+            <a:picLocks noGrp="1" noChangeAspect="1"/>
+          </p:cNvPicPr>
+          <p:nvPr/>
+        </p:nvPicPr>
+        <p:blipFill>
+          <a:blip r:embed="rId2"/>
+          <a:stretch>
+            <a:fillRect/>
+          </a:stretch>
+        </p:blipFill>
+        <p:spPr bwMode="auto">
+          <a:xfrm>
+            <a:off x="1244600" y="1536700"/>
+            <a:ext cx="6781800" cy="4521200"/>
+          </a:xfrm>
+          <a:prstGeom prst="rect">
+            <a:avLst/>
+          </a:prstGeom>
+          <a:noFill/>
+          <a:ln w="9525">
+            <a:noFill/>
+            <a:headEnd/>
+            <a:tailEnd/>
+          </a:ln>
+        </p:spPr>
+      </p:pic>
+    </p:spTree>
+  </p:cSld>
+</p:sld>
+</file>
+
+<file path=ppt/slides/slide5.xml><?xml version="1.0" encoding="utf-8"?>
+<p:sld xmlns:a="http://schemas.openxmlformats.org/drawingml/2006/main" xmlns:r="http://schemas.openxmlformats.org/officeDocument/2006/relationships" xmlns:p="http://schemas.openxmlformats.org/presentationml/2006/main">
+  <p:cSld>
+    <p:spTree>
+      <p:nvGrpSpPr>
+        <p:cNvPr id="1" name=""/>
+        <p:cNvGrpSpPr/>
+        <p:nvPr/>
+      </p:nvGrpSpPr>
+      <p:grpSpPr>
+        <a:xfrm>
+          <a:off x="0" y="0"/>
+          <a:ext cx="0" cy="0"/>
+          <a:chOff x="0" y="0"/>
+          <a:chExt cx="0" cy="0"/>
+        </a:xfrm>
+      </p:grpSpPr>
+      <p:sp>
+        <p:nvSpPr>
+          <p:cNvPr id="2" name="タイトル 1"/>
+          <p:cNvSpPr>
+            <a:spLocks noGrp="1"/>
+          </p:cNvSpPr>
+          <p:nvPr>
+            <p:ph type="title"/>
+          </p:nvPr>
+        </p:nvSpPr>
+        <p:spPr>
+          <a:xfrm>
+            <a:off x="528547" y="447705"/>
+            <a:ext cx="8229600" cy="838338"/>
+          </a:xfrm>
+        </p:spPr>
+        <p:txBody>
+          <a:bodyPr/>
+          <a:lstStyle/>
+          <a:p>
+            <a:pPr lvl="0" marL="0" indent="0">
+              <a:buNone/>
+            </a:pPr>
+            <a:r>
+              <a:rPr/>
+              <a:t>所得控除から税額控除</a:t>
+            </a:r>
+          </a:p>
+        </p:txBody>
+      </p:sp>
+      <p:pic>
+        <p:nvPicPr>
+          <p:cNvPr descr="C:/Users/vge00/Desktop/NaSTaB/report/200710Meeting_files/figure-pptx/MTR-1.png" id="0" name="Picture 1"/>
+          <p:cNvPicPr>
+            <a:picLocks noGrp="1" noChangeAspect="1"/>
+          </p:cNvPicPr>
+          <p:nvPr/>
+        </p:nvPicPr>
+        <p:blipFill>
+          <a:blip r:embed="rId2"/>
+          <a:stretch>
+            <a:fillRect/>
+          </a:stretch>
+        </p:blipFill>
+        <p:spPr bwMode="auto">
+          <a:xfrm>
+            <a:off x="1244600" y="1536700"/>
+            <a:ext cx="6781800" cy="4521200"/>
+          </a:xfrm>
+          <a:prstGeom prst="rect">
+            <a:avLst/>
+          </a:prstGeom>
+          <a:noFill/>
+          <a:ln w="9525">
+            <a:noFill/>
+            <a:headEnd/>
+            <a:tailEnd/>
+          </a:ln>
+        </p:spPr>
+      </p:pic>
+    </p:spTree>
+  </p:cSld>
+</p:sld>
+</file>
+
+<file path=ppt/slides/slide6.xml><?xml version="1.0" encoding="utf-8"?>
+<p:sld xmlns:a="http://schemas.openxmlformats.org/drawingml/2006/main" xmlns:r="http://schemas.openxmlformats.org/officeDocument/2006/relationships" xmlns:p="http://schemas.openxmlformats.org/presentationml/2006/main">
+  <p:cSld>
+    <p:spTree>
+      <p:nvGrpSpPr>
+        <p:cNvPr id="1" name=""/>
+        <p:cNvGrpSpPr/>
+        <p:nvPr/>
+      </p:nvGrpSpPr>
+      <p:grpSpPr>
+        <a:xfrm>
+          <a:off x="0" y="0"/>
+          <a:ext cx="0" cy="0"/>
+          <a:chOff x="0" y="0"/>
+          <a:chExt cx="0" cy="0"/>
+        </a:xfrm>
+      </p:grpSpPr>
+      <p:sp>
+        <p:nvSpPr>
+          <p:cNvPr id="2" name="タイトル 1"/>
+          <p:cNvSpPr>
+            <a:spLocks noGrp="1"/>
+          </p:cNvSpPr>
+          <p:nvPr>
+            <p:ph type="title"/>
+          </p:nvPr>
+        </p:nvSpPr>
+        <p:spPr>
+          <a:xfrm>
+            <a:off x="528547" y="447705"/>
+            <a:ext cx="8229600" cy="838338"/>
+          </a:xfrm>
+        </p:spPr>
+        <p:txBody>
+          <a:bodyPr/>
+          <a:lstStyle/>
+          <a:p>
+            <a:pPr lvl="0" marL="0" indent="0">
+              <a:buNone/>
+            </a:pPr>
+            <a:r>
+              <a:rPr/>
+              <a:t>識別戦略</a:t>
+            </a:r>
+          </a:p>
+        </p:txBody>
+      </p:sp>
+      <p:sp>
+        <p:nvSpPr>
+          <p:cNvPr id="3" name="コンテンツ プレースホルダー 2"/>
+          <p:cNvSpPr>
+            <a:spLocks noGrp="1"/>
+          </p:cNvSpPr>
+          <p:nvPr>
+            <p:ph idx="1"/>
+          </p:nvPr>
+        </p:nvSpPr>
+        <p:spPr/>
+        <p:txBody>
+          <a:bodyPr/>
+          <a:lstStyle/>
+          <a:p>
+            <a:pPr lvl="1"/>
+            <a:r>
+              <a:rPr/>
+              <a:t>Marginal tax rate in 2013 &lt; 税額控除率</a:t>
+            </a:r>
+          </a:p>
+          <a:p>
+            <a:pPr lvl="2"/>
+            <a:r>
+              <a:rPr/>
+              <a:t>寄付の価格が減少するので、寄付を増やす（利他的選好）</a:t>
+            </a:r>
+          </a:p>
+          <a:p>
+            <a:pPr lvl="2"/>
+            <a:r>
+              <a:rPr/>
+              <a:t>1単位あたりのRefundが増えるので、寄付を減らすことで前回のRefund amountに調整（Refund motivation）</a:t>
+            </a:r>
+          </a:p>
+          <a:p>
+            <a:pPr lvl="1"/>
+            <a:r>
+              <a:rPr/>
+              <a:t>Marginal tax rate in 2013 &gt; 税額控除率</a:t>
+            </a:r>
+          </a:p>
+          <a:p>
+            <a:pPr lvl="2"/>
+            <a:r>
+              <a:rPr/>
+              <a:t>寄付の価格が上昇するので、寄付を減らす（利他的選好）</a:t>
+            </a:r>
+          </a:p>
+          <a:p>
+            <a:pPr lvl="2"/>
+            <a:r>
+              <a:rPr/>
+              <a:t>1単位あたりのRefundが増えるので、寄付を増やすことで前回のRefund amountに調整（Refund motivation）</a:t>
+            </a:r>
+          </a:p>
+        </p:txBody>
+      </p:sp>
+    </p:spTree>
+  </p:cSld>
+</p:sld>
+</file>
+
+<file path=ppt/slides/slide7.xml><?xml version="1.0" encoding="utf-8"?>
+<p:sld xmlns:a="http://schemas.openxmlformats.org/drawingml/2006/main" xmlns:r="http://schemas.openxmlformats.org/officeDocument/2006/relationships" xmlns:p="http://schemas.openxmlformats.org/presentationml/2006/main">
+  <p:cSld>
+    <p:spTree>
+      <p:nvGrpSpPr>
+        <p:cNvPr id="1" name=""/>
+        <p:cNvGrpSpPr/>
+        <p:nvPr/>
+      </p:nvGrpSpPr>
+      <p:grpSpPr>
+        <a:xfrm>
+          <a:off x="0" y="0"/>
+          <a:ext cx="0" cy="0"/>
+          <a:chOff x="0" y="0"/>
+          <a:chExt cx="0" cy="0"/>
+        </a:xfrm>
+      </p:grpSpPr>
+      <p:sp>
+        <p:nvSpPr>
+          <p:cNvPr id="2" name="タイトル 1"/>
+          <p:cNvSpPr>
+            <a:spLocks noGrp="1"/>
+          </p:cNvSpPr>
+          <p:nvPr>
+            <p:ph type="title"/>
+          </p:nvPr>
+        </p:nvSpPr>
+        <p:spPr>
+          <a:xfrm>
+            <a:off x="528547" y="447705"/>
+            <a:ext cx="8229600" cy="838338"/>
+          </a:xfrm>
+        </p:spPr>
+        <p:txBody>
+          <a:bodyPr/>
+          <a:lstStyle/>
+          <a:p>
+            <a:pPr lvl="0" marL="0" indent="0">
+              <a:buNone/>
+            </a:pPr>
+            <a:r>
+              <a:rPr/>
+              <a:t>Difference</a:t>
+            </a:r>
+            <a:r>
+              <a:rPr/>
+              <a:t> </a:t>
+            </a:r>
+            <a:r>
+              <a:rPr/>
+              <a:t>in</a:t>
+            </a:r>
+            <a:r>
+              <a:rPr/>
+              <a:t> </a:t>
+            </a:r>
+            <a:r>
+              <a:rPr/>
+              <a:t>Refund</a:t>
+            </a:r>
+            <a:r>
+              <a:rPr/>
+              <a:t> </a:t>
+            </a:r>
+            <a:r>
+              <a:rPr/>
+              <a:t>Amount</a:t>
+            </a:r>
+          </a:p>
+        </p:txBody>
+      </p:sp>
+      <p:pic>
+        <p:nvPicPr>
+          <p:cNvPr descr="C:/Users/vge00/Desktop/NaSTaB/report/200710Meeting_files/figure-pptx/deductive_credit_amount-1.png" id="0" name="Picture 1"/>
+          <p:cNvPicPr>
+            <a:picLocks noGrp="1" noChangeAspect="1"/>
+          </p:cNvPicPr>
+          <p:nvPr/>
+        </p:nvPicPr>
+        <p:blipFill>
+          <a:blip r:embed="rId2"/>
+          <a:stretch>
+            <a:fillRect/>
+          </a:stretch>
+        </p:blipFill>
+        <p:spPr bwMode="auto">
+          <a:xfrm>
+            <a:off x="1244600" y="1536700"/>
+            <a:ext cx="6781800" cy="4521200"/>
+          </a:xfrm>
+          <a:prstGeom prst="rect">
+            <a:avLst/>
+          </a:prstGeom>
+          <a:noFill/>
+          <a:ln w="9525">
+            <a:noFill/>
+            <a:headEnd/>
+            <a:tailEnd/>
+          </a:ln>
+        </p:spPr>
+      </p:pic>
+    </p:spTree>
+  </p:cSld>
+</p:sld>
+</file>
+
+<file path=ppt/slides/slide8.xml><?xml version="1.0" encoding="utf-8"?>
+<p:sld xmlns:a="http://schemas.openxmlformats.org/drawingml/2006/main" xmlns:r="http://schemas.openxmlformats.org/officeDocument/2006/relationships" xmlns:p="http://schemas.openxmlformats.org/presentationml/2006/main">
+  <p:cSld>
+    <p:spTree>
+      <p:nvGrpSpPr>
+        <p:cNvPr id="1" name=""/>
+        <p:cNvGrpSpPr/>
+        <p:nvPr/>
+      </p:nvGrpSpPr>
+      <p:grpSpPr>
+        <a:xfrm>
+          <a:off x="0" y="0"/>
+          <a:ext cx="0" cy="0"/>
+          <a:chOff x="0" y="0"/>
+          <a:chExt cx="0" cy="0"/>
+        </a:xfrm>
+      </p:grpSpPr>
+      <p:sp>
+        <p:nvSpPr>
+          <p:cNvPr id="2" name="タイトル 1"/>
+          <p:cNvSpPr>
+            <a:spLocks noGrp="1"/>
+          </p:cNvSpPr>
+          <p:nvPr>
+            <p:ph type="title"/>
+          </p:nvPr>
+        </p:nvSpPr>
+        <p:spPr>
+          <a:xfrm>
+            <a:off x="528547" y="447705"/>
+            <a:ext cx="8229600" cy="838338"/>
+          </a:xfrm>
+        </p:spPr>
+        <p:txBody>
+          <a:bodyPr/>
+          <a:lstStyle/>
+          <a:p>
+            <a:pPr lvl="0" marL="0" indent="0">
+              <a:buNone/>
+            </a:pPr>
+            <a:r>
+              <a:rPr/>
+              <a:t>Difference</a:t>
+            </a:r>
+            <a:r>
+              <a:rPr/>
+              <a:t> </a:t>
+            </a:r>
+            <a:r>
+              <a:rPr/>
+              <a:t>in</a:t>
+            </a:r>
+            <a:r>
+              <a:rPr/>
+              <a:t> </a:t>
+            </a:r>
+            <a:r>
+              <a:rPr/>
+              <a:t>Imputed</a:t>
+            </a:r>
+            <a:r>
+              <a:rPr/>
+              <a:t> </a:t>
+            </a:r>
+            <a:r>
+              <a:rPr/>
+              <a:t>Refund</a:t>
+            </a:r>
+            <a:r>
+              <a:rPr/>
+              <a:t> </a:t>
+            </a:r>
+            <a:r>
+              <a:rPr/>
+              <a:t>Amount</a:t>
+            </a:r>
+          </a:p>
+        </p:txBody>
+      </p:sp>
+      <p:pic>
+        <p:nvPicPr>
+          <p:cNvPr descr="C:/Users/vge00/Desktop/NaSTaB/report/200710Meeting_files/figure-pptx/deductive_credit_amount_imputed-1.png" id="0" name="Picture 1"/>
+          <p:cNvPicPr>
+            <a:picLocks noGrp="1" noChangeAspect="1"/>
+          </p:cNvPicPr>
+          <p:nvPr/>
+        </p:nvPicPr>
+        <p:blipFill>
+          <a:blip r:embed="rId2"/>
+          <a:stretch>
+            <a:fillRect/>
+          </a:stretch>
+        </p:blipFill>
+        <p:spPr bwMode="auto">
+          <a:xfrm>
+            <a:off x="1244600" y="1536700"/>
+            <a:ext cx="6781800" cy="4521200"/>
+          </a:xfrm>
+          <a:prstGeom prst="rect">
+            <a:avLst/>
+          </a:prstGeom>
+          <a:noFill/>
+          <a:ln w="9525">
+            <a:noFill/>
+            <a:headEnd/>
+            <a:tailEnd/>
+          </a:ln>
+        </p:spPr>
+      </p:pic>
+    </p:spTree>
+  </p:cSld>
+</p:sld>
+</file>
+
+<file path=ppt/slides/slide9.xml><?xml version="1.0" encoding="utf-8"?>
+<p:sld xmlns:a="http://schemas.openxmlformats.org/drawingml/2006/main" xmlns:r="http://schemas.openxmlformats.org/officeDocument/2006/relationships" xmlns:p="http://schemas.openxmlformats.org/presentationml/2006/main">
+  <p:cSld>
+    <p:spTree>
+      <p:nvGrpSpPr>
+        <p:cNvPr id="1" name=""/>
+        <p:cNvGrpSpPr/>
+        <p:nvPr/>
+      </p:nvGrpSpPr>
+      <p:grpSpPr>
+        <a:xfrm>
+          <a:off x="0" y="0"/>
+          <a:ext cx="0" cy="0"/>
+          <a:chOff x="0" y="0"/>
+          <a:chExt cx="0" cy="0"/>
+        </a:xfrm>
+      </p:grpSpPr>
+      <p:sp>
+        <p:nvSpPr>
+          <p:cNvPr id="2" name="タイトル 1"/>
+          <p:cNvSpPr>
+            <a:spLocks noGrp="1"/>
+          </p:cNvSpPr>
+          <p:nvPr>
+            <p:ph type="title"/>
+          </p:nvPr>
+        </p:nvSpPr>
+        <p:spPr>
+          <a:xfrm>
+            <a:off x="528547" y="447705"/>
+            <a:ext cx="8229600" cy="838338"/>
+          </a:xfrm>
+        </p:spPr>
+        <p:txBody>
+          <a:bodyPr/>
+          <a:lstStyle/>
+          <a:p>
+            <a:pPr lvl="0" marL="0" indent="0">
+              <a:buNone/>
+            </a:pPr>
+            <a:r>
+              <a:rPr/>
+              <a:t>Primitive</a:t>
+            </a:r>
+            <a:r>
+              <a:rPr/>
+              <a:t> </a:t>
+            </a:r>
+            <a:r>
+              <a:rPr/>
+              <a:t>Regression</a:t>
+            </a:r>
+          </a:p>
+        </p:txBody>
+      </p:sp>
+      <mc:AlternateContent xmlns:mc="http://schemas.openxmlformats.org/markup-compatibility/2006">
+        <mc:Choice xmlns:a14="http://schemas.microsoft.com/office/drawing/2010/main" Requires="a14">
+          <p:sp>
+            <p:nvSpPr>
+              <p:cNvPr id="3" name="コンテンツ プレースホルダー 2"/>
+              <p:cNvSpPr>
+                <a:spLocks noGrp="1"/>
+              </p:cNvSpPr>
+              <p:nvPr>
+                <p:ph idx="1"/>
+              </p:nvPr>
+            </p:nvSpPr>
+            <p:spPr/>
+            <p:txBody>
+              <a:bodyPr/>
+              <a:lstStyle/>
+              <a:p>
+                <a:pPr lvl="0" marL="0" indent="0">
+                  <a:buNone/>
+                </a:pPr>
+                <a14:m>
+                  <m:oMathPara xmlns:m="http://schemas.openxmlformats.org/officeDocument/2006/math">
+                    <m:oMathParaPr>
+                      <m:jc m:val="center"/>
+                    </m:oMathParaPr>
+                    <m:oMath>
+                      <m:sSub>
+                        <m:e>
+                          <m:r>
+                            <m:t>Y</m:t>
+                          </m:r>
+                        </m:e>
+                        <m:sub>
+                          <m:r>
+                            <m:t>i</m:t>
+                          </m:r>
+                        </m:sub>
+                      </m:sSub>
+                      <m:r>
+                        <m:t>=</m:t>
+                      </m:r>
+                      <m:r>
+                        <m:t>α</m:t>
+                      </m:r>
+                      <m:r>
+                        <m:t>+</m:t>
+                      </m:r>
+                      <m:sSub>
+                        <m:e>
+                          <m:r>
+                            <m:t>β</m:t>
+                          </m:r>
+                        </m:e>
+                        <m:sub>
+                          <m:r>
+                            <m:t>1</m:t>
+                          </m:r>
+                        </m:sub>
+                      </m:sSub>
+                      <m:r>
+                        <m:t>L</m:t>
+                      </m:r>
+                      <m:r>
+                        <m:t>o</m:t>
+                      </m:r>
+                      <m:r>
+                        <m:t>s</m:t>
+                      </m:r>
+                      <m:r>
+                        <m:t>s</m:t>
+                      </m:r>
+                      <m:r>
+                        <m:t>+</m:t>
+                      </m:r>
+                      <m:sSub>
+                        <m:e>
+                          <m:r>
+                            <m:t>β</m:t>
+                          </m:r>
+                        </m:e>
+                        <m:sub>
+                          <m:r>
+                            <m:t>2</m:t>
+                          </m:r>
+                        </m:sub>
+                      </m:sSub>
+                      <m:r>
+                        <m:t>G</m:t>
+                      </m:r>
+                      <m:r>
+                        <m:t>a</m:t>
+                      </m:r>
+                      <m:r>
+                        <m:t>i</m:t>
+                      </m:r>
+                      <m:r>
+                        <m:t>n</m:t>
+                      </m:r>
+                      <m:r>
+                        <m:t>+</m:t>
+                      </m:r>
+                      <m:sSub>
+                        <m:e>
+                          <m:r>
+                            <m:t>β</m:t>
+                          </m:r>
+                        </m:e>
+                        <m:sub>
+                          <m:r>
+                            <m:t>3</m:t>
+                          </m:r>
+                        </m:sub>
+                      </m:sSub>
+                      <m:r>
+                        <m:t>P</m:t>
+                      </m:r>
+                      <m:r>
+                        <m:t>r</m:t>
+                      </m:r>
+                      <m:r>
+                        <m:t>o</m:t>
+                      </m:r>
+                      <m:r>
+                        <m:t>p</m:t>
+                      </m:r>
+                      <m:r>
+                        <m:t>e</m:t>
+                      </m:r>
+                      <m:r>
+                        <m:t>n</m:t>
+                      </m:r>
+                      <m:r>
+                        <m:t>s</m:t>
+                      </m:r>
+                      <m:r>
+                        <m:t>i</m:t>
+                      </m:r>
+                      <m:r>
+                        <m:t>t</m:t>
+                      </m:r>
+                      <m:r>
+                        <m:t>y</m:t>
+                      </m:r>
+                      <m:r>
+                        <m:t>+</m:t>
+                      </m:r>
+                      <m:sSub>
+                        <m:e>
+                          <m:r>
+                            <m:t>δ</m:t>
+                          </m:r>
+                        </m:e>
+                        <m:sub>
+                          <m:r>
+                            <m:t>1</m:t>
+                          </m:r>
+                        </m:sub>
+                      </m:sSub>
+                      <m:r>
+                        <m:t>L</m:t>
+                      </m:r>
+                      <m:r>
+                        <m:t>o</m:t>
+                      </m:r>
+                      <m:r>
+                        <m:t>s</m:t>
+                      </m:r>
+                      <m:r>
+                        <m:t>s</m:t>
+                      </m:r>
+                      <m:r>
+                        <m:t>⋅</m:t>
+                      </m:r>
+                      <m:r>
+                        <m:t>P</m:t>
+                      </m:r>
+                      <m:r>
+                        <m:t>r</m:t>
+                      </m:r>
+                      <m:r>
+                        <m:t>o</m:t>
+                      </m:r>
+                      <m:r>
+                        <m:t>p</m:t>
+                      </m:r>
+                      <m:r>
+                        <m:t>e</m:t>
+                      </m:r>
+                      <m:r>
+                        <m:t>n</m:t>
+                      </m:r>
+                      <m:r>
+                        <m:t>s</m:t>
+                      </m:r>
+                      <m:r>
+                        <m:t>i</m:t>
+                      </m:r>
+                      <m:r>
+                        <m:t>t</m:t>
+                      </m:r>
+                      <m:r>
+                        <m:t>y</m:t>
+                      </m:r>
+                      <m:r>
+                        <m:t>+</m:t>
+                      </m:r>
+                      <m:sSub>
+                        <m:e>
+                          <m:r>
+                            <m:t>δ</m:t>
+                          </m:r>
+                        </m:e>
+                        <m:sub>
+                          <m:r>
+                            <m:t>2</m:t>
+                          </m:r>
+                        </m:sub>
+                      </m:sSub>
+                      <m:r>
+                        <m:t>G</m:t>
+                      </m:r>
+                      <m:r>
+                        <m:t>a</m:t>
+                      </m:r>
+                      <m:r>
+                        <m:t>i</m:t>
+                      </m:r>
+                      <m:r>
+                        <m:t>n</m:t>
+                      </m:r>
+                      <m:r>
+                        <m:t>⋅</m:t>
+                      </m:r>
+                      <m:r>
+                        <m:t>P</m:t>
+                      </m:r>
+                      <m:r>
+                        <m:t>r</m:t>
+                      </m:r>
+                      <m:r>
+                        <m:t>o</m:t>
+                      </m:r>
+                      <m:r>
+                        <m:t>p</m:t>
+                      </m:r>
+                      <m:r>
+                        <m:t>e</m:t>
+                      </m:r>
+                      <m:r>
+                        <m:t>n</m:t>
+                      </m:r>
+                      <m:r>
+                        <m:t>s</m:t>
+                      </m:r>
+                      <m:r>
+                        <m:t>i</m:t>
+                      </m:r>
+                      <m:r>
+                        <m:t>t</m:t>
+                      </m:r>
+                      <m:r>
+                        <m:t>y</m:t>
+                      </m:r>
+                      <m:r>
+                        <m:t>+</m:t>
+                      </m:r>
+                      <m:r>
+                        <m:t>λ</m:t>
+                      </m:r>
+                      <m:sSub>
+                        <m:e>
+                          <m:r>
+                            <m:t>X</m:t>
+                          </m:r>
+                        </m:e>
+                        <m:sub>
+                          <m:r>
+                            <m:t>i</m:t>
+                          </m:r>
+                        </m:sub>
+                      </m:sSub>
+                    </m:oMath>
+                  </m:oMathPara>
+                </a14:m>
+              </a:p>
+              <a:p>
+                <a:pPr lvl="1"/>
+                <a14:m>
+                  <m:oMath xmlns:m="http://schemas.openxmlformats.org/officeDocument/2006/math">
+                    <m:sSub>
+                      <m:e>
+                        <m:r>
+                          <m:t>Y</m:t>
+                        </m:r>
+                      </m:e>
+                      <m:sub>
+                        <m:r>
+                          <m:t>i</m:t>
+                        </m:r>
+                      </m:sub>
+                    </m:sSub>
+                    <m:r>
+                      <m:t>=</m:t>
+                    </m:r>
+                    <m:r>
+                      <m:rPr>
+                        <m:nor/>
+                        <m:sty m:val="p"/>
+                      </m:rPr>
+                      <m:t>log</m:t>
+                    </m:r>
+                    <m:sSub>
+                      <m:e>
+                        <m:r>
+                          <m:t>D</m:t>
+                        </m:r>
+                      </m:e>
+                      <m:sub>
+                        <m:r>
+                          <m:t>14</m:t>
+                        </m:r>
+                      </m:sub>
+                    </m:sSub>
+                    <m:r>
+                      <m:t>/</m:t>
+                    </m:r>
+                    <m:r>
+                      <m:rPr>
+                        <m:nor/>
+                        <m:sty m:val="p"/>
+                      </m:rPr>
+                      <m:t>log</m:t>
+                    </m:r>
+                    <m:sSub>
+                      <m:e>
+                        <m:r>
+                          <m:t>D</m:t>
+                        </m:r>
+                      </m:e>
+                      <m:sub>
+                        <m:r>
+                          <m:t>13</m:t>
+                        </m:r>
+                      </m:sub>
+                    </m:sSub>
+                  </m:oMath>
+                </a14:m>
+              </a:p>
+              <a:p>
+                <a:pPr lvl="1"/>
+                <a14:m>
+                  <m:oMath xmlns:m="http://schemas.openxmlformats.org/officeDocument/2006/math">
+                    <m:r>
+                      <m:t>L</m:t>
+                    </m:r>
+                    <m:r>
+                      <m:t>o</m:t>
+                    </m:r>
+                    <m:r>
+                      <m:t>s</m:t>
+                    </m:r>
+                    <m:r>
+                      <m:t>s</m:t>
+                    </m:r>
+                  </m:oMath>
+                </a14:m>
+                <a:r>
+                  <a:rPr/>
+                  <a:t>: Marginal tax rate in 2013 &gt; 税額控除率</a:t>
+                </a:r>
+              </a:p>
+              <a:p>
+                <a:pPr lvl="1"/>
+                <a14:m>
+                  <m:oMath xmlns:m="http://schemas.openxmlformats.org/officeDocument/2006/math">
+                    <m:r>
+                      <m:t>G</m:t>
+                    </m:r>
+                    <m:r>
+                      <m:t>a</m:t>
+                    </m:r>
+                    <m:r>
+                      <m:t>i</m:t>
+                    </m:r>
+                    <m:r>
+                      <m:t>n</m:t>
+                    </m:r>
+                  </m:oMath>
+                </a14:m>
+                <a:r>
+                  <a:rPr/>
+                  <a:t>: Marginal tax rate in 2013 &lt; 税額控除率</a:t>
+                </a:r>
+              </a:p>
+              <a:p>
+                <a:pPr lvl="1"/>
+                <a14:m>
+                  <m:oMath xmlns:m="http://schemas.openxmlformats.org/officeDocument/2006/math">
+                    <m:r>
+                      <m:t>X</m:t>
+                    </m:r>
+                  </m:oMath>
+                </a14:m>
+                <a:r>
+                  <a:rPr/>
+                  <a:t>: 年齢（二乗項）、所得（2013年、2014年）、性別</a:t>
+                </a:r>
+              </a:p>
+            </p:txBody>
+          </p:sp>
+        </mc:Choice>
+      </mc:AlternateContent>
     </p:spTree>
   </p:cSld>
 </p:sld>

</xml_diff>